<commit_message>
aggiunta video demo della tesi
</commit_message>
<xml_diff>
--- a/docs/tesi/MSE_Master Thesis_Presentation_AlessioTommasi PostIncontro.pptx
+++ b/docs/tesi/MSE_Master Thesis_Presentation_AlessioTommasi PostIncontro.pptx
@@ -195,7 +195,7 @@
       </p:grpSpPr>
       <p:sp>
         <p:nvSpPr>
-          <p:cNvPr id="515504019" name="Rectangle 2"/>
+          <p:cNvPr id="470713412" name="Rectangle 2"/>
           <p:cNvSpPr>
             <a:spLocks noChangeArrowheads="1" noGrp="1"/>
           </p:cNvSpPr>
@@ -242,7 +242,7 @@
       </p:sp>
       <p:sp>
         <p:nvSpPr>
-          <p:cNvPr id="1825304257" name="Rectangle 3"/>
+          <p:cNvPr id="536751151" name="Rectangle 3"/>
           <p:cNvSpPr>
             <a:spLocks noChangeArrowheads="1" noGrp="1"/>
           </p:cNvSpPr>
@@ -289,7 +289,7 @@
       </p:sp>
       <p:sp>
         <p:nvSpPr>
-          <p:cNvPr id="492915097" name="Rectangle 4"/>
+          <p:cNvPr id="49653778" name="Rectangle 4"/>
           <p:cNvSpPr>
             <a:spLocks noChangeArrowheads="1" noChangeAspect="1" noGrp="1" noRot="1" noTextEdit="1"/>
           </p:cNvSpPr>
@@ -318,7 +318,7 @@
       </p:sp>
       <p:sp>
         <p:nvSpPr>
-          <p:cNvPr id="1837038578" name="Rectangle 5"/>
+          <p:cNvPr id="1111042912" name="Rectangle 5"/>
           <p:cNvSpPr>
             <a:spLocks noChangeArrowheads="1" noGrp="1"/>
           </p:cNvSpPr>
@@ -402,7 +402,7 @@
       </p:sp>
       <p:sp>
         <p:nvSpPr>
-          <p:cNvPr id="2002929082" name="Rectangle 6"/>
+          <p:cNvPr id="1224645033" name="Rectangle 6"/>
           <p:cNvSpPr>
             <a:spLocks noChangeArrowheads="1" noGrp="1"/>
           </p:cNvSpPr>
@@ -449,7 +449,7 @@
       </p:sp>
       <p:sp>
         <p:nvSpPr>
-          <p:cNvPr id="556561745" name="Rectangle 7"/>
+          <p:cNvPr id="802197041" name="Rectangle 7"/>
           <p:cNvSpPr>
             <a:spLocks noChangeArrowheads="1" noGrp="1"/>
           </p:cNvSpPr>
@@ -643,7 +643,7 @@
       </p:grpSpPr>
       <p:sp>
         <p:nvSpPr>
-          <p:cNvPr id="381925987" name="Slide Image Placeholder 1"/>
+          <p:cNvPr id="1032634938" name="Slide Image Placeholder 1"/>
           <p:cNvSpPr>
             <a:spLocks noChangeAspect="1" noGrp="1" noRot="1"/>
           </p:cNvSpPr>
@@ -655,7 +655,7 @@
       </p:sp>
       <p:sp>
         <p:nvSpPr>
-          <p:cNvPr id="165419393" name="Notes Placeholder 2"/>
+          <p:cNvPr id="1249464681" name="Notes Placeholder 2"/>
           <p:cNvSpPr>
             <a:spLocks noGrp="1"/>
           </p:cNvSpPr>
@@ -758,7 +758,7 @@
       </p:sp>
       <p:sp>
         <p:nvSpPr>
-          <p:cNvPr id="2014747719" name="Slide Number Placeholder 3"/>
+          <p:cNvPr id="1020158830" name="Slide Number Placeholder 3"/>
           <p:cNvSpPr>
             <a:spLocks noGrp="1"/>
           </p:cNvSpPr>
@@ -809,7 +809,7 @@
       </p:grpSpPr>
       <p:sp>
         <p:nvSpPr>
-          <p:cNvPr id="649191623" name="Segnaposto immagine diapositiva 1"/>
+          <p:cNvPr id="274825497" name="Segnaposto immagine diapositiva 1"/>
           <p:cNvSpPr>
             <a:spLocks noChangeAspect="1" noGrp="1" noRot="1"/>
           </p:cNvSpPr>
@@ -821,7 +821,7 @@
       </p:sp>
       <p:sp>
         <p:nvSpPr>
-          <p:cNvPr id="765451520" name="Segnaposto note 2"/>
+          <p:cNvPr id="548045556" name="Segnaposto note 2"/>
           <p:cNvSpPr>
             <a:spLocks noGrp="1"/>
           </p:cNvSpPr>
@@ -961,7 +961,7 @@
       </p:sp>
       <p:sp>
         <p:nvSpPr>
-          <p:cNvPr id="1526073987" name="Segnaposto numero diapositiva 3"/>
+          <p:cNvPr id="927177037" name="Segnaposto numero diapositiva 3"/>
           <p:cNvSpPr>
             <a:spLocks noGrp="1"/>
           </p:cNvSpPr>
@@ -1012,7 +1012,7 @@
       </p:grpSpPr>
       <p:sp>
         <p:nvSpPr>
-          <p:cNvPr id="1142349722" name="Segnaposto immagine diapositiva 1"/>
+          <p:cNvPr id="1656573446" name="Segnaposto immagine diapositiva 1"/>
           <p:cNvSpPr>
             <a:spLocks noChangeAspect="1" noGrp="1" noRot="1"/>
           </p:cNvSpPr>
@@ -1024,7 +1024,7 @@
       </p:sp>
       <p:sp>
         <p:nvSpPr>
-          <p:cNvPr id="1256634064" name="Segnaposto note 2"/>
+          <p:cNvPr id="1004565664" name="Segnaposto note 2"/>
           <p:cNvSpPr>
             <a:spLocks noGrp="1"/>
           </p:cNvSpPr>
@@ -1172,7 +1172,7 @@
       </p:sp>
       <p:sp>
         <p:nvSpPr>
-          <p:cNvPr id="1575253667" name="Segnaposto numero diapositiva 3"/>
+          <p:cNvPr id="1172969706" name="Segnaposto numero diapositiva 3"/>
           <p:cNvSpPr>
             <a:spLocks noGrp="1"/>
           </p:cNvSpPr>
@@ -1223,7 +1223,7 @@
       </p:grpSpPr>
       <p:sp>
         <p:nvSpPr>
-          <p:cNvPr id="377265304" name="Segnaposto immagine diapositiva 1"/>
+          <p:cNvPr id="464570573" name="Segnaposto immagine diapositiva 1"/>
           <p:cNvSpPr>
             <a:spLocks noChangeAspect="1" noGrp="1" noRot="1"/>
           </p:cNvSpPr>
@@ -1235,7 +1235,7 @@
       </p:sp>
       <p:sp>
         <p:nvSpPr>
-          <p:cNvPr id="869489513" name="Segnaposto note 2"/>
+          <p:cNvPr id="734606365" name="Segnaposto note 2"/>
           <p:cNvSpPr>
             <a:spLocks noGrp="1"/>
           </p:cNvSpPr>
@@ -1352,7 +1352,7 @@
       </p:sp>
       <p:sp>
         <p:nvSpPr>
-          <p:cNvPr id="1298373519" name="Segnaposto numero diapositiva 3"/>
+          <p:cNvPr id="663260784" name="Segnaposto numero diapositiva 3"/>
           <p:cNvSpPr>
             <a:spLocks noGrp="1"/>
           </p:cNvSpPr>
@@ -1403,7 +1403,7 @@
       </p:grpSpPr>
       <p:sp>
         <p:nvSpPr>
-          <p:cNvPr id="1298652217" name="Segnaposto immagine diapositiva 1"/>
+          <p:cNvPr id="1465729685" name="Segnaposto immagine diapositiva 1"/>
           <p:cNvSpPr>
             <a:spLocks noChangeAspect="1" noGrp="1" noRot="1"/>
           </p:cNvSpPr>
@@ -1415,7 +1415,7 @@
       </p:sp>
       <p:sp>
         <p:nvSpPr>
-          <p:cNvPr id="1193564568" name="Segnaposto note 2"/>
+          <p:cNvPr id="2020081487" name="Segnaposto note 2"/>
           <p:cNvSpPr>
             <a:spLocks noGrp="1"/>
           </p:cNvSpPr>
@@ -1836,7 +1836,7 @@
       </p:sp>
       <p:sp>
         <p:nvSpPr>
-          <p:cNvPr id="1519866954" name="Segnaposto numero diapositiva 3"/>
+          <p:cNvPr id="83303036" name="Segnaposto numero diapositiva 3"/>
           <p:cNvSpPr>
             <a:spLocks noGrp="1"/>
           </p:cNvSpPr>
@@ -1887,7 +1887,7 @@
       </p:grpSpPr>
       <p:sp>
         <p:nvSpPr>
-          <p:cNvPr id="86121674" name="Segnaposto immagine diapositiva 1"/>
+          <p:cNvPr id="526603138" name="Segnaposto immagine diapositiva 1"/>
           <p:cNvSpPr>
             <a:spLocks noChangeAspect="1" noGrp="1" noRot="1"/>
           </p:cNvSpPr>
@@ -1899,7 +1899,7 @@
       </p:sp>
       <p:sp>
         <p:nvSpPr>
-          <p:cNvPr id="1415524509" name="Segnaposto note 2"/>
+          <p:cNvPr id="921376740" name="Segnaposto note 2"/>
           <p:cNvSpPr>
             <a:spLocks noGrp="1"/>
           </p:cNvSpPr>
@@ -2492,7 +2492,7 @@
       </p:sp>
       <p:sp>
         <p:nvSpPr>
-          <p:cNvPr id="389853353" name="Segnaposto numero diapositiva 3"/>
+          <p:cNvPr id="792213483" name="Segnaposto numero diapositiva 3"/>
           <p:cNvSpPr>
             <a:spLocks noGrp="1"/>
           </p:cNvSpPr>
@@ -2543,7 +2543,7 @@
       </p:grpSpPr>
       <p:sp>
         <p:nvSpPr>
-          <p:cNvPr id="293955380" name="Segnaposto immagine diapositiva 1"/>
+          <p:cNvPr id="594707765" name="Segnaposto immagine diapositiva 1"/>
           <p:cNvSpPr>
             <a:spLocks noChangeAspect="1" noGrp="1" noRot="1"/>
           </p:cNvSpPr>
@@ -2555,7 +2555,7 @@
       </p:sp>
       <p:sp>
         <p:nvSpPr>
-          <p:cNvPr id="1357796215" name="Segnaposto note 2"/>
+          <p:cNvPr id="1438053847" name="Segnaposto note 2"/>
           <p:cNvSpPr>
             <a:spLocks noGrp="1"/>
           </p:cNvSpPr>
@@ -2768,7 +2768,7 @@
       </p:sp>
       <p:sp>
         <p:nvSpPr>
-          <p:cNvPr id="347679659" name="Segnaposto numero diapositiva 3"/>
+          <p:cNvPr id="618670220" name="Segnaposto numero diapositiva 3"/>
           <p:cNvSpPr>
             <a:spLocks noGrp="1"/>
           </p:cNvSpPr>
@@ -2819,7 +2819,7 @@
       </p:grpSpPr>
       <p:sp>
         <p:nvSpPr>
-          <p:cNvPr id="1174171499" name="Segnaposto immagine diapositiva 1"/>
+          <p:cNvPr id="1717172550" name="Segnaposto immagine diapositiva 1"/>
           <p:cNvSpPr>
             <a:spLocks noChangeAspect="1" noGrp="1" noRot="1"/>
           </p:cNvSpPr>
@@ -2831,7 +2831,7 @@
       </p:sp>
       <p:sp>
         <p:nvSpPr>
-          <p:cNvPr id="1751556966" name="Segnaposto note 2"/>
+          <p:cNvPr id="1761941458" name="Segnaposto note 2"/>
           <p:cNvSpPr>
             <a:spLocks noGrp="1"/>
           </p:cNvSpPr>
@@ -2973,7 +2973,7 @@
       </p:sp>
       <p:sp>
         <p:nvSpPr>
-          <p:cNvPr id="2143647904" name="Segnaposto numero diapositiva 3"/>
+          <p:cNvPr id="1613046034" name="Segnaposto numero diapositiva 3"/>
           <p:cNvSpPr>
             <a:spLocks noGrp="1"/>
           </p:cNvSpPr>
@@ -3024,7 +3024,7 @@
       </p:grpSpPr>
       <p:sp>
         <p:nvSpPr>
-          <p:cNvPr id="1998784677" name="Segnaposto immagine diapositiva 1"/>
+          <p:cNvPr id="468392171" name="Segnaposto immagine diapositiva 1"/>
           <p:cNvSpPr>
             <a:spLocks noChangeAspect="1" noGrp="1" noRot="1"/>
           </p:cNvSpPr>
@@ -3036,7 +3036,7 @@
       </p:sp>
       <p:sp>
         <p:nvSpPr>
-          <p:cNvPr id="926276107" name="Segnaposto note 2"/>
+          <p:cNvPr id="1401644482" name="Segnaposto note 2"/>
           <p:cNvSpPr>
             <a:spLocks noGrp="1"/>
           </p:cNvSpPr>
@@ -3219,7 +3219,7 @@
       </p:sp>
       <p:sp>
         <p:nvSpPr>
-          <p:cNvPr id="1344566855" name="Segnaposto numero diapositiva 3"/>
+          <p:cNvPr id="511450396" name="Segnaposto numero diapositiva 3"/>
           <p:cNvSpPr>
             <a:spLocks noGrp="1"/>
           </p:cNvSpPr>
@@ -3270,7 +3270,7 @@
       </p:grpSpPr>
       <p:sp>
         <p:nvSpPr>
-          <p:cNvPr id="747217844" name="Segnaposto immagine diapositiva 1"/>
+          <p:cNvPr id="212536856" name="Segnaposto immagine diapositiva 1"/>
           <p:cNvSpPr>
             <a:spLocks noChangeAspect="1" noGrp="1" noRot="1"/>
           </p:cNvSpPr>
@@ -3282,7 +3282,7 @@
       </p:sp>
       <p:sp>
         <p:nvSpPr>
-          <p:cNvPr id="837128779" name="Segnaposto note 2"/>
+          <p:cNvPr id="926885411" name="Segnaposto note 2"/>
           <p:cNvSpPr>
             <a:spLocks noGrp="1"/>
           </p:cNvSpPr>
@@ -3412,7 +3412,7 @@
       </p:sp>
       <p:sp>
         <p:nvSpPr>
-          <p:cNvPr id="1126393488" name="Segnaposto numero diapositiva 3"/>
+          <p:cNvPr id="1013093730" name="Segnaposto numero diapositiva 3"/>
           <p:cNvSpPr>
             <a:spLocks noGrp="1"/>
           </p:cNvSpPr>
@@ -3463,7 +3463,7 @@
       </p:grpSpPr>
       <p:sp>
         <p:nvSpPr>
-          <p:cNvPr id="769351731" name="Segnaposto immagine diapositiva 1"/>
+          <p:cNvPr id="341270991" name="Segnaposto immagine diapositiva 1"/>
           <p:cNvSpPr>
             <a:spLocks noChangeAspect="1" noGrp="1" noRot="1"/>
           </p:cNvSpPr>
@@ -3475,7 +3475,7 @@
       </p:sp>
       <p:sp>
         <p:nvSpPr>
-          <p:cNvPr id="942309972" name="Segnaposto note 2"/>
+          <p:cNvPr id="965028317" name="Segnaposto note 2"/>
           <p:cNvSpPr>
             <a:spLocks noGrp="1"/>
           </p:cNvSpPr>
@@ -3766,7 +3766,7 @@
       </p:sp>
       <p:sp>
         <p:nvSpPr>
-          <p:cNvPr id="527228823" name="Segnaposto numero diapositiva 3"/>
+          <p:cNvPr id="769387418" name="Segnaposto numero diapositiva 3"/>
           <p:cNvSpPr>
             <a:spLocks noGrp="1"/>
           </p:cNvSpPr>
@@ -3817,7 +3817,7 @@
       </p:grpSpPr>
       <p:sp>
         <p:nvSpPr>
-          <p:cNvPr id="885102470" name="Segnaposto immagine diapositiva 1"/>
+          <p:cNvPr id="150546659" name="Segnaposto immagine diapositiva 1"/>
           <p:cNvSpPr>
             <a:spLocks noChangeAspect="1" noGrp="1" noRot="1"/>
           </p:cNvSpPr>
@@ -3829,7 +3829,7 @@
       </p:sp>
       <p:sp>
         <p:nvSpPr>
-          <p:cNvPr id="1778841117" name="Segnaposto note 2"/>
+          <p:cNvPr id="60271218" name="Segnaposto note 2"/>
           <p:cNvSpPr>
             <a:spLocks noGrp="1"/>
           </p:cNvSpPr>
@@ -4120,7 +4120,7 @@
       </p:sp>
       <p:sp>
         <p:nvSpPr>
-          <p:cNvPr id="1130144161" name="Segnaposto numero diapositiva 3"/>
+          <p:cNvPr id="1512759845" name="Segnaposto numero diapositiva 3"/>
           <p:cNvSpPr>
             <a:spLocks noGrp="1"/>
           </p:cNvSpPr>
@@ -4171,7 +4171,7 @@
       </p:grpSpPr>
       <p:sp>
         <p:nvSpPr>
-          <p:cNvPr id="1350377256" name="Segnaposto immagine diapositiva 1"/>
+          <p:cNvPr id="2068440321" name="Segnaposto immagine diapositiva 1"/>
           <p:cNvSpPr>
             <a:spLocks noChangeAspect="1" noGrp="1" noRot="1"/>
           </p:cNvSpPr>
@@ -4183,7 +4183,7 @@
       </p:sp>
       <p:sp>
         <p:nvSpPr>
-          <p:cNvPr id="290393526" name="Segnaposto note 2"/>
+          <p:cNvPr id="1211964076" name="Segnaposto note 2"/>
           <p:cNvSpPr>
             <a:spLocks noGrp="1"/>
           </p:cNvSpPr>
@@ -4377,7 +4377,7 @@
       </p:sp>
       <p:sp>
         <p:nvSpPr>
-          <p:cNvPr id="1951410000" name="Segnaposto numero diapositiva 3"/>
+          <p:cNvPr id="59252143" name="Segnaposto numero diapositiva 3"/>
           <p:cNvSpPr>
             <a:spLocks noGrp="1"/>
           </p:cNvSpPr>
@@ -4428,7 +4428,7 @@
       </p:grpSpPr>
       <p:sp>
         <p:nvSpPr>
-          <p:cNvPr id="1684010253" name="Segnaposto immagine diapositiva 1"/>
+          <p:cNvPr id="464436907" name="Segnaposto immagine diapositiva 1"/>
           <p:cNvSpPr>
             <a:spLocks noChangeAspect="1" noGrp="1" noRot="1"/>
           </p:cNvSpPr>
@@ -4440,7 +4440,7 @@
       </p:sp>
       <p:sp>
         <p:nvSpPr>
-          <p:cNvPr id="1540492728" name="Segnaposto note 2"/>
+          <p:cNvPr id="754761618" name="Segnaposto note 2"/>
           <p:cNvSpPr>
             <a:spLocks noGrp="1"/>
           </p:cNvSpPr>
@@ -4586,7 +4586,7 @@
       </p:sp>
       <p:sp>
         <p:nvSpPr>
-          <p:cNvPr id="1060106512" name="Segnaposto numero diapositiva 3"/>
+          <p:cNvPr id="941772933" name="Segnaposto numero diapositiva 3"/>
           <p:cNvSpPr>
             <a:spLocks noGrp="1"/>
           </p:cNvSpPr>
@@ -4637,7 +4637,7 @@
       </p:grpSpPr>
       <p:sp>
         <p:nvSpPr>
-          <p:cNvPr id="235194217" name="Segnaposto immagine diapositiva 1"/>
+          <p:cNvPr id="248735072" name="Segnaposto immagine diapositiva 1"/>
           <p:cNvSpPr>
             <a:spLocks noChangeAspect="1" noGrp="1" noRot="1"/>
           </p:cNvSpPr>
@@ -4649,7 +4649,7 @@
       </p:sp>
       <p:sp>
         <p:nvSpPr>
-          <p:cNvPr id="447770918" name="Segnaposto note 2"/>
+          <p:cNvPr id="1851423382" name="Segnaposto note 2"/>
           <p:cNvSpPr>
             <a:spLocks noGrp="1"/>
           </p:cNvSpPr>
@@ -4802,7 +4802,7 @@
       </p:sp>
       <p:sp>
         <p:nvSpPr>
-          <p:cNvPr id="1649946860" name="Segnaposto numero diapositiva 3"/>
+          <p:cNvPr id="734310876" name="Segnaposto numero diapositiva 3"/>
           <p:cNvSpPr>
             <a:spLocks noGrp="1"/>
           </p:cNvSpPr>
@@ -4853,7 +4853,7 @@
       </p:grpSpPr>
       <p:sp>
         <p:nvSpPr>
-          <p:cNvPr id="744075608" name="Segnaposto immagine diapositiva 1"/>
+          <p:cNvPr id="1829615392" name="Segnaposto immagine diapositiva 1"/>
           <p:cNvSpPr>
             <a:spLocks noChangeAspect="1" noGrp="1" noRot="1"/>
           </p:cNvSpPr>
@@ -4865,7 +4865,7 @@
       </p:sp>
       <p:sp>
         <p:nvSpPr>
-          <p:cNvPr id="722587812" name="Segnaposto note 2"/>
+          <p:cNvPr id="1120047726" name="Segnaposto note 2"/>
           <p:cNvSpPr>
             <a:spLocks noGrp="1"/>
           </p:cNvSpPr>
@@ -5027,7 +5027,7 @@
       </p:sp>
       <p:sp>
         <p:nvSpPr>
-          <p:cNvPr id="142372462" name="Segnaposto numero diapositiva 3"/>
+          <p:cNvPr id="981689530" name="Segnaposto numero diapositiva 3"/>
           <p:cNvSpPr>
             <a:spLocks noGrp="1"/>
           </p:cNvSpPr>
@@ -5078,7 +5078,7 @@
       </p:grpSpPr>
       <p:sp>
         <p:nvSpPr>
-          <p:cNvPr id="336067143" name="Segnaposto immagine diapositiva 1"/>
+          <p:cNvPr id="1933856943" name="Segnaposto immagine diapositiva 1"/>
           <p:cNvSpPr>
             <a:spLocks noChangeAspect="1" noGrp="1" noRot="1"/>
           </p:cNvSpPr>
@@ -5090,7 +5090,7 @@
       </p:sp>
       <p:sp>
         <p:nvSpPr>
-          <p:cNvPr id="194272883" name="Segnaposto note 2"/>
+          <p:cNvPr id="3697994" name="Segnaposto note 2"/>
           <p:cNvSpPr>
             <a:spLocks noGrp="1"/>
           </p:cNvSpPr>
@@ -5192,7 +5192,7 @@
       </p:sp>
       <p:sp>
         <p:nvSpPr>
-          <p:cNvPr id="1257175806" name="Segnaposto numero diapositiva 3"/>
+          <p:cNvPr id="706775927" name="Segnaposto numero diapositiva 3"/>
           <p:cNvSpPr>
             <a:spLocks noGrp="1"/>
           </p:cNvSpPr>
@@ -5243,7 +5243,7 @@
       </p:grpSpPr>
       <p:sp>
         <p:nvSpPr>
-          <p:cNvPr id="334815856" name="Segnaposto immagine diapositiva 1"/>
+          <p:cNvPr id="1501421787" name="Segnaposto immagine diapositiva 1"/>
           <p:cNvSpPr>
             <a:spLocks noChangeAspect="1" noGrp="1" noRot="1"/>
           </p:cNvSpPr>
@@ -5255,7 +5255,7 @@
       </p:sp>
       <p:sp>
         <p:nvSpPr>
-          <p:cNvPr id="1383224437" name="Segnaposto note 2"/>
+          <p:cNvPr id="464948598" name="Segnaposto note 2"/>
           <p:cNvSpPr>
             <a:spLocks noGrp="1"/>
           </p:cNvSpPr>
@@ -5371,7 +5371,7 @@
       </p:sp>
       <p:sp>
         <p:nvSpPr>
-          <p:cNvPr id="967327552" name="Segnaposto numero diapositiva 3"/>
+          <p:cNvPr id="1562504550" name="Segnaposto numero diapositiva 3"/>
           <p:cNvSpPr>
             <a:spLocks noGrp="1"/>
           </p:cNvSpPr>
@@ -5422,7 +5422,7 @@
       </p:grpSpPr>
       <p:sp>
         <p:nvSpPr>
-          <p:cNvPr id="1457527491" name="Segnaposto immagine diapositiva 1"/>
+          <p:cNvPr id="1761568076" name="Segnaposto immagine diapositiva 1"/>
           <p:cNvSpPr>
             <a:spLocks noChangeAspect="1" noGrp="1" noRot="1"/>
           </p:cNvSpPr>
@@ -5434,7 +5434,7 @@
       </p:sp>
       <p:sp>
         <p:nvSpPr>
-          <p:cNvPr id="1705200413" name="Segnaposto note 2"/>
+          <p:cNvPr id="233976408" name="Segnaposto note 2"/>
           <p:cNvSpPr>
             <a:spLocks noGrp="1"/>
           </p:cNvSpPr>
@@ -5676,7 +5676,7 @@
       </p:sp>
       <p:sp>
         <p:nvSpPr>
-          <p:cNvPr id="357553751" name="Segnaposto numero diapositiva 3"/>
+          <p:cNvPr id="1611167389" name="Segnaposto numero diapositiva 3"/>
           <p:cNvSpPr>
             <a:spLocks noGrp="1"/>
           </p:cNvSpPr>
@@ -5727,7 +5727,7 @@
       </p:grpSpPr>
       <p:sp>
         <p:nvSpPr>
-          <p:cNvPr id="787070676" name="Segnaposto immagine diapositiva 1"/>
+          <p:cNvPr id="1219621836" name="Segnaposto immagine diapositiva 1"/>
           <p:cNvSpPr>
             <a:spLocks noChangeAspect="1" noGrp="1" noRot="1"/>
           </p:cNvSpPr>
@@ -5739,7 +5739,7 @@
       </p:sp>
       <p:sp>
         <p:nvSpPr>
-          <p:cNvPr id="2024532032" name="Segnaposto note 2"/>
+          <p:cNvPr id="1989998846" name="Segnaposto note 2"/>
           <p:cNvSpPr>
             <a:spLocks noGrp="1"/>
           </p:cNvSpPr>
@@ -6075,7 +6075,7 @@
       </p:sp>
       <p:sp>
         <p:nvSpPr>
-          <p:cNvPr id="836232450" name="Segnaposto numero diapositiva 3"/>
+          <p:cNvPr id="2069317471" name="Segnaposto numero diapositiva 3"/>
           <p:cNvSpPr>
             <a:spLocks noGrp="1"/>
           </p:cNvSpPr>
@@ -6126,7 +6126,7 @@
       </p:grpSpPr>
       <p:sp>
         <p:nvSpPr>
-          <p:cNvPr id="932151712" name="Segnaposto immagine diapositiva 1"/>
+          <p:cNvPr id="2111083283" name="Segnaposto immagine diapositiva 1"/>
           <p:cNvSpPr>
             <a:spLocks noChangeAspect="1" noGrp="1" noRot="1"/>
           </p:cNvSpPr>
@@ -6138,7 +6138,7 @@
       </p:sp>
       <p:sp>
         <p:nvSpPr>
-          <p:cNvPr id="455519167" name="Segnaposto note 2"/>
+          <p:cNvPr id="1991258967" name="Segnaposto note 2"/>
           <p:cNvSpPr>
             <a:spLocks noGrp="1"/>
           </p:cNvSpPr>
@@ -6380,7 +6380,7 @@
       </p:sp>
       <p:sp>
         <p:nvSpPr>
-          <p:cNvPr id="1239105848" name="Segnaposto numero diapositiva 3"/>
+          <p:cNvPr id="223976057" name="Segnaposto numero diapositiva 3"/>
           <p:cNvSpPr>
             <a:spLocks noGrp="1"/>
           </p:cNvSpPr>
@@ -6431,7 +6431,7 @@
       </p:grpSpPr>
       <p:sp>
         <p:nvSpPr>
-          <p:cNvPr id="1081240988" name="Slide Image Placeholder 1"/>
+          <p:cNvPr id="824808392" name="Slide Image Placeholder 1"/>
           <p:cNvSpPr>
             <a:spLocks noChangeAspect="1" noGrp="1" noRot="1"/>
           </p:cNvSpPr>
@@ -6443,7 +6443,7 @@
       </p:sp>
       <p:sp>
         <p:nvSpPr>
-          <p:cNvPr id="1341599956" name="Notes Placeholder 2"/>
+          <p:cNvPr id="317365609" name="Notes Placeholder 2"/>
           <p:cNvSpPr>
             <a:spLocks noGrp="1"/>
           </p:cNvSpPr>
@@ -6570,7 +6570,7 @@
       </p:sp>
       <p:sp>
         <p:nvSpPr>
-          <p:cNvPr id="1178167581" name="Slide Number Placeholder 3"/>
+          <p:cNvPr id="1910014676" name="Slide Number Placeholder 3"/>
           <p:cNvSpPr>
             <a:spLocks noGrp="1"/>
           </p:cNvSpPr>
@@ -6621,7 +6621,7 @@
       </p:grpSpPr>
       <p:sp>
         <p:nvSpPr>
-          <p:cNvPr id="426223502" name="Segnaposto immagine diapositiva 1"/>
+          <p:cNvPr id="337314038" name="Segnaposto immagine diapositiva 1"/>
           <p:cNvSpPr>
             <a:spLocks noChangeAspect="1" noGrp="1" noRot="1"/>
           </p:cNvSpPr>
@@ -6633,7 +6633,7 @@
       </p:sp>
       <p:sp>
         <p:nvSpPr>
-          <p:cNvPr id="1503672592" name="Segnaposto note 2"/>
+          <p:cNvPr id="1977044592" name="Segnaposto note 2"/>
           <p:cNvSpPr>
             <a:spLocks noGrp="1"/>
           </p:cNvSpPr>
@@ -6849,7 +6849,7 @@
       </p:sp>
       <p:sp>
         <p:nvSpPr>
-          <p:cNvPr id="546617491" name="Segnaposto numero diapositiva 3"/>
+          <p:cNvPr id="1855377018" name="Segnaposto numero diapositiva 3"/>
           <p:cNvSpPr>
             <a:spLocks noGrp="1"/>
           </p:cNvSpPr>
@@ -6900,7 +6900,7 @@
       </p:grpSpPr>
       <p:sp>
         <p:nvSpPr>
-          <p:cNvPr id="811236746" name="Slide Image Placeholder 1"/>
+          <p:cNvPr id="293070332" name="Slide Image Placeholder 1"/>
           <p:cNvSpPr>
             <a:spLocks noChangeAspect="1" noGrp="1" noRot="1"/>
           </p:cNvSpPr>
@@ -6912,7 +6912,7 @@
       </p:sp>
       <p:sp>
         <p:nvSpPr>
-          <p:cNvPr id="435034222" name="Notes Placeholder 2"/>
+          <p:cNvPr id="20818559" name="Notes Placeholder 2"/>
           <p:cNvSpPr>
             <a:spLocks noGrp="1"/>
           </p:cNvSpPr>
@@ -6934,7 +6934,7 @@
       </p:sp>
       <p:sp>
         <p:nvSpPr>
-          <p:cNvPr id="502617100" name="Slide Number Placeholder 3"/>
+          <p:cNvPr id="1297479870" name="Slide Number Placeholder 3"/>
           <p:cNvSpPr>
             <a:spLocks noGrp="1"/>
           </p:cNvSpPr>
@@ -6985,7 +6985,7 @@
       </p:grpSpPr>
       <p:sp>
         <p:nvSpPr>
-          <p:cNvPr id="1324977014" name="Segnaposto immagine diapositiva 1"/>
+          <p:cNvPr id="1245822577" name="Segnaposto immagine diapositiva 1"/>
           <p:cNvSpPr>
             <a:spLocks noChangeAspect="1" noGrp="1" noRot="1"/>
           </p:cNvSpPr>
@@ -6997,7 +6997,7 @@
       </p:sp>
       <p:sp>
         <p:nvSpPr>
-          <p:cNvPr id="148980560" name="Segnaposto note 2"/>
+          <p:cNvPr id="1044315141" name="Segnaposto note 2"/>
           <p:cNvSpPr>
             <a:spLocks noGrp="1"/>
           </p:cNvSpPr>
@@ -7238,7 +7238,7 @@
       </p:sp>
       <p:sp>
         <p:nvSpPr>
-          <p:cNvPr id="764867173" name="Segnaposto numero diapositiva 3"/>
+          <p:cNvPr id="1967377282" name="Segnaposto numero diapositiva 3"/>
           <p:cNvSpPr>
             <a:spLocks noGrp="1"/>
           </p:cNvSpPr>
@@ -7289,7 +7289,7 @@
       </p:grpSpPr>
       <p:sp>
         <p:nvSpPr>
-          <p:cNvPr id="1203085244" name="Segnaposto immagine diapositiva 1"/>
+          <p:cNvPr id="98208503" name="Segnaposto immagine diapositiva 1"/>
           <p:cNvSpPr>
             <a:spLocks noChangeAspect="1" noGrp="1" noRot="1"/>
           </p:cNvSpPr>
@@ -7301,7 +7301,7 @@
       </p:sp>
       <p:sp>
         <p:nvSpPr>
-          <p:cNvPr id="1165948234" name="Segnaposto note 2"/>
+          <p:cNvPr id="1315089819" name="Segnaposto note 2"/>
           <p:cNvSpPr>
             <a:spLocks noGrp="1"/>
           </p:cNvSpPr>
@@ -7435,7 +7435,7 @@
       </p:sp>
       <p:sp>
         <p:nvSpPr>
-          <p:cNvPr id="786826289" name="Segnaposto numero diapositiva 3"/>
+          <p:cNvPr id="1171495702" name="Segnaposto numero diapositiva 3"/>
           <p:cNvSpPr>
             <a:spLocks noGrp="1"/>
           </p:cNvSpPr>
@@ -7486,7 +7486,7 @@
       </p:grpSpPr>
       <p:sp>
         <p:nvSpPr>
-          <p:cNvPr id="283026246" name="Segnaposto immagine diapositiva 1"/>
+          <p:cNvPr id="123685184" name="Segnaposto immagine diapositiva 1"/>
           <p:cNvSpPr>
             <a:spLocks noChangeAspect="1" noGrp="1" noRot="1"/>
           </p:cNvSpPr>
@@ -7498,7 +7498,7 @@
       </p:sp>
       <p:sp>
         <p:nvSpPr>
-          <p:cNvPr id="323125833" name="Segnaposto note 2"/>
+          <p:cNvPr id="561236570" name="Segnaposto note 2"/>
           <p:cNvSpPr>
             <a:spLocks noGrp="1"/>
           </p:cNvSpPr>
@@ -7662,7 +7662,7 @@
       </p:sp>
       <p:sp>
         <p:nvSpPr>
-          <p:cNvPr id="23930157" name="Segnaposto numero diapositiva 3"/>
+          <p:cNvPr id="237031787" name="Segnaposto numero diapositiva 3"/>
           <p:cNvSpPr>
             <a:spLocks noGrp="1"/>
           </p:cNvSpPr>
@@ -7713,7 +7713,7 @@
       </p:grpSpPr>
       <p:sp>
         <p:nvSpPr>
-          <p:cNvPr id="472213385" name="Segnaposto immagine diapositiva 1"/>
+          <p:cNvPr id="182601548" name="Segnaposto immagine diapositiva 1"/>
           <p:cNvSpPr>
             <a:spLocks noChangeAspect="1" noGrp="1" noRot="1"/>
           </p:cNvSpPr>
@@ -7725,7 +7725,7 @@
       </p:sp>
       <p:sp>
         <p:nvSpPr>
-          <p:cNvPr id="349386742" name="Segnaposto note 2"/>
+          <p:cNvPr id="811742467" name="Segnaposto note 2"/>
           <p:cNvSpPr>
             <a:spLocks noGrp="1"/>
           </p:cNvSpPr>
@@ -7921,7 +7921,7 @@
       </p:sp>
       <p:sp>
         <p:nvSpPr>
-          <p:cNvPr id="743645380" name="Segnaposto numero diapositiva 3"/>
+          <p:cNvPr id="454892500" name="Segnaposto numero diapositiva 3"/>
           <p:cNvSpPr>
             <a:spLocks noGrp="1"/>
           </p:cNvSpPr>
@@ -7972,7 +7972,7 @@
       </p:grpSpPr>
       <p:sp>
         <p:nvSpPr>
-          <p:cNvPr id="1132740031" name="Segnaposto immagine diapositiva 1"/>
+          <p:cNvPr id="731459644" name="Segnaposto immagine diapositiva 1"/>
           <p:cNvSpPr>
             <a:spLocks noChangeAspect="1" noGrp="1" noRot="1"/>
           </p:cNvSpPr>
@@ -7984,7 +7984,7 @@
       </p:sp>
       <p:sp>
         <p:nvSpPr>
-          <p:cNvPr id="1775782247" name="Segnaposto note 2"/>
+          <p:cNvPr id="591687130" name="Segnaposto note 2"/>
           <p:cNvSpPr>
             <a:spLocks noGrp="1"/>
           </p:cNvSpPr>
@@ -8119,7 +8119,7 @@
       </p:sp>
       <p:sp>
         <p:nvSpPr>
-          <p:cNvPr id="1564463015" name="Segnaposto numero diapositiva 3"/>
+          <p:cNvPr id="1229049725" name="Segnaposto numero diapositiva 3"/>
           <p:cNvSpPr>
             <a:spLocks noGrp="1"/>
           </p:cNvSpPr>
@@ -8170,7 +8170,7 @@
       </p:grpSpPr>
       <p:sp>
         <p:nvSpPr>
-          <p:cNvPr id="1448138093" name="Segnaposto immagine diapositiva 1"/>
+          <p:cNvPr id="1081099047" name="Segnaposto immagine diapositiva 1"/>
           <p:cNvSpPr>
             <a:spLocks noChangeAspect="1" noGrp="1" noRot="1"/>
           </p:cNvSpPr>
@@ -8182,7 +8182,7 @@
       </p:sp>
       <p:sp>
         <p:nvSpPr>
-          <p:cNvPr id="1279327781" name="Segnaposto note 2"/>
+          <p:cNvPr id="823249429" name="Segnaposto note 2"/>
           <p:cNvSpPr>
             <a:spLocks noGrp="1"/>
           </p:cNvSpPr>
@@ -8356,7 +8356,7 @@
       </p:sp>
       <p:sp>
         <p:nvSpPr>
-          <p:cNvPr id="2080211333" name="Segnaposto numero diapositiva 3"/>
+          <p:cNvPr id="459291036" name="Segnaposto numero diapositiva 3"/>
           <p:cNvSpPr>
             <a:spLocks noGrp="1"/>
           </p:cNvSpPr>
@@ -8407,7 +8407,7 @@
       </p:grpSpPr>
       <p:sp>
         <p:nvSpPr>
-          <p:cNvPr id="1539138190" name="Rectangle 2"/>
+          <p:cNvPr id="1095210017" name="Rectangle 2"/>
           <p:cNvSpPr>
             <a:spLocks noChangeArrowheads="1" noGrp="1"/>
           </p:cNvSpPr>
@@ -8455,7 +8455,7 @@
       </p:sp>
       <p:sp>
         <p:nvSpPr>
-          <p:cNvPr id="711921242" name="Segnaposto testo 12"/>
+          <p:cNvPr id="1846335873" name="Segnaposto testo 12"/>
           <p:cNvSpPr>
             <a:spLocks noGrp="1"/>
           </p:cNvSpPr>
@@ -8506,7 +8506,7 @@
       </p:sp>
       <p:cxnSp>
         <p:nvCxnSpPr>
-          <p:cNvPr id="1977097950" name="Connettore 1 10"/>
+          <p:cNvPr id="1843052969" name="Connettore 1 10"/>
           <p:cNvCxnSpPr/>
           <p:nvPr userDrawn="1"/>
         </p:nvCxnSpPr>
@@ -8541,7 +8541,7 @@
       </p:cxnSp>
       <p:sp>
         <p:nvSpPr>
-          <p:cNvPr id="679824984" name="Segnaposto testo 12"/>
+          <p:cNvPr id="62632428" name="Segnaposto testo 12"/>
           <p:cNvSpPr>
             <a:spLocks noGrp="1"/>
           </p:cNvSpPr>
@@ -8583,7 +8583,7 @@
       </p:sp>
       <p:sp>
         <p:nvSpPr>
-          <p:cNvPr id="477592350" name="Segnaposto testo 12"/>
+          <p:cNvPr id="1076081728" name="Segnaposto testo 12"/>
           <p:cNvSpPr>
             <a:spLocks noGrp="1"/>
           </p:cNvSpPr>
@@ -8634,7 +8634,7 @@
       </p:sp>
       <p:cxnSp>
         <p:nvCxnSpPr>
-          <p:cNvPr id="755359779" name="Connettore 1 24"/>
+          <p:cNvPr id="1586639284" name="Connettore 1 24"/>
           <p:cNvCxnSpPr/>
           <p:nvPr userDrawn="1"/>
         </p:nvCxnSpPr>
@@ -8669,7 +8669,7 @@
       </p:cxnSp>
       <p:sp>
         <p:nvSpPr>
-          <p:cNvPr id="374953997" name="Segnaposto testo 12"/>
+          <p:cNvPr id="581220148" name="Segnaposto testo 12"/>
           <p:cNvSpPr>
             <a:spLocks noGrp="1"/>
           </p:cNvSpPr>
@@ -8711,7 +8711,7 @@
       </p:sp>
       <p:sp>
         <p:nvSpPr>
-          <p:cNvPr id="1973862372" name="Segnaposto testo 12"/>
+          <p:cNvPr id="1827331007" name="Segnaposto testo 12"/>
           <p:cNvSpPr>
             <a:spLocks noGrp="1"/>
           </p:cNvSpPr>
@@ -8753,7 +8753,7 @@
       </p:sp>
       <p:sp>
         <p:nvSpPr>
-          <p:cNvPr id="438773050" name="Segnaposto testo 12"/>
+          <p:cNvPr id="1963970045" name="Segnaposto testo 12"/>
           <p:cNvSpPr>
             <a:spLocks noGrp="1"/>
           </p:cNvSpPr>
@@ -8803,7 +8803,7 @@
       </p:sp>
       <p:sp>
         <p:nvSpPr>
-          <p:cNvPr id="381870006" name="Segnaposto testo 12"/>
+          <p:cNvPr id="929234113" name="Segnaposto testo 12"/>
           <p:cNvSpPr>
             <a:spLocks noGrp="1"/>
           </p:cNvSpPr>
@@ -8845,7 +8845,7 @@
       </p:sp>
       <p:sp>
         <p:nvSpPr>
-          <p:cNvPr id="1672534963" name="Segnaposto testo 12"/>
+          <p:cNvPr id="1468061314" name="Segnaposto testo 12"/>
           <p:cNvSpPr>
             <a:spLocks noGrp="1"/>
           </p:cNvSpPr>
@@ -8884,7 +8884,7 @@
       </p:sp>
       <p:sp>
         <p:nvSpPr>
-          <p:cNvPr id="417369282" name="Segnaposto testo 12"/>
+          <p:cNvPr id="1822049537" name="Segnaposto testo 12"/>
           <p:cNvSpPr>
             <a:spLocks noGrp="1"/>
           </p:cNvSpPr>
@@ -8923,7 +8923,7 @@
       </p:sp>
       <p:cxnSp>
         <p:nvCxnSpPr>
-          <p:cNvPr id="461379610" name="Connettore 1 44"/>
+          <p:cNvPr id="773349436" name="Connettore 1 44"/>
           <p:cNvCxnSpPr/>
           <p:nvPr userDrawn="1"/>
         </p:nvCxnSpPr>
@@ -8958,7 +8958,7 @@
       </p:cxnSp>
       <p:sp>
         <p:nvSpPr>
-          <p:cNvPr id="2083642929" name="Segnaposto testo 12"/>
+          <p:cNvPr id="407490324" name="Segnaposto testo 12"/>
           <p:cNvSpPr>
             <a:spLocks noGrp="1"/>
           </p:cNvSpPr>
@@ -9000,7 +9000,7 @@
       </p:sp>
       <p:sp>
         <p:nvSpPr>
-          <p:cNvPr id="498067685" name="Segnaposto testo 12"/>
+          <p:cNvPr id="1818077500" name="Segnaposto testo 12"/>
           <p:cNvSpPr>
             <a:spLocks noGrp="1"/>
           </p:cNvSpPr>
@@ -9042,7 +9042,7 @@
       </p:sp>
       <p:sp>
         <p:nvSpPr>
-          <p:cNvPr id="569061053" name="Segnaposto testo 12"/>
+          <p:cNvPr id="2054896853" name="Segnaposto testo 12"/>
           <p:cNvSpPr>
             <a:spLocks noGrp="1"/>
           </p:cNvSpPr>
@@ -9081,7 +9081,7 @@
       </p:sp>
       <p:sp>
         <p:nvSpPr>
-          <p:cNvPr id="1486894528" name="Segnaposto testo 12"/>
+          <p:cNvPr id="1400712437" name="Segnaposto testo 12"/>
           <p:cNvSpPr>
             <a:spLocks noGrp="1"/>
           </p:cNvSpPr>
@@ -9123,7 +9123,7 @@
       </p:sp>
       <p:sp>
         <p:nvSpPr>
-          <p:cNvPr id="1158664821" name="Segnaposto testo 12"/>
+          <p:cNvPr id="931175821" name="Segnaposto testo 12"/>
           <p:cNvSpPr>
             <a:spLocks noGrp="1"/>
           </p:cNvSpPr>
@@ -9162,7 +9162,7 @@
       </p:sp>
       <p:pic>
         <p:nvPicPr>
-          <p:cNvPr id="1528357521" name="Immagine 9" descr="Modulo_SUPSI_DTI.gif"/>
+          <p:cNvPr id="274973324" name="Immagine 9" descr="Modulo_SUPSI_DTI.gif"/>
           <p:cNvPicPr>
             <a:picLocks noChangeAspect="1"/>
           </p:cNvPicPr>
@@ -9192,7 +9192,7 @@
       </p:pic>
       <p:sp>
         <p:nvSpPr>
-          <p:cNvPr id="1978326397" name="Segnaposto testo 12"/>
+          <p:cNvPr id="1996205386" name="Segnaposto testo 12"/>
           <p:cNvSpPr>
             <a:spLocks noGrp="1"/>
           </p:cNvSpPr>
@@ -9231,7 +9231,7 @@
       </p:sp>
       <p:sp>
         <p:nvSpPr>
-          <p:cNvPr id="1028844616" name="Segnaposto testo 12"/>
+          <p:cNvPr id="724481801" name="Segnaposto testo 12"/>
           <p:cNvSpPr>
             <a:spLocks noGrp="1"/>
           </p:cNvSpPr>
@@ -9273,7 +9273,7 @@
       </p:sp>
       <p:sp>
         <p:nvSpPr>
-          <p:cNvPr id="1461220199" name="Text Placeholder 6"/>
+          <p:cNvPr id="767280464" name="Text Placeholder 6"/>
           <p:cNvSpPr>
             <a:spLocks noGrp="1"/>
           </p:cNvSpPr>
@@ -9355,7 +9355,7 @@
       </p:grpSpPr>
       <p:sp>
         <p:nvSpPr>
-          <p:cNvPr id="1625619357" name="Segnaposto testo 12"/>
+          <p:cNvPr id="793426344" name="Segnaposto testo 12"/>
           <p:cNvSpPr>
             <a:spLocks noGrp="1"/>
           </p:cNvSpPr>
@@ -9412,7 +9412,7 @@
       </p:sp>
       <p:sp>
         <p:nvSpPr>
-          <p:cNvPr id="910467613" name="Content Placeholder 3"/>
+          <p:cNvPr id="303431195" name="Content Placeholder 3"/>
           <p:cNvSpPr>
             <a:spLocks noGrp="1"/>
           </p:cNvSpPr>
@@ -9502,7 +9502,7 @@
       </p:sp>
       <p:sp>
         <p:nvSpPr>
-          <p:cNvPr id="1697394075" name="Content Placeholder 3"/>
+          <p:cNvPr id="1566594055" name="Content Placeholder 3"/>
           <p:cNvSpPr>
             <a:spLocks noGrp="1"/>
           </p:cNvSpPr>
@@ -9617,7 +9617,7 @@
       </p:grpSpPr>
       <p:sp>
         <p:nvSpPr>
-          <p:cNvPr id="1405037389" name="Segnaposto testo 12"/>
+          <p:cNvPr id="1311637918" name="Segnaposto testo 12"/>
           <p:cNvSpPr>
             <a:spLocks noGrp="1"/>
           </p:cNvSpPr>
@@ -9674,7 +9674,7 @@
       </p:sp>
       <p:sp>
         <p:nvSpPr>
-          <p:cNvPr id="1467914467" name="Content Placeholder 3"/>
+          <p:cNvPr id="1341838733" name="Content Placeholder 3"/>
           <p:cNvSpPr>
             <a:spLocks noGrp="1"/>
           </p:cNvSpPr>
@@ -9794,7 +9794,7 @@
       </p:grpSpPr>
       <p:pic>
         <p:nvPicPr>
-          <p:cNvPr id="2090337909" name="Immagine 5"/>
+          <p:cNvPr id="1473636284" name="Immagine 5"/>
           <p:cNvPicPr>
             <a:picLocks noChangeAspect="1"/>
           </p:cNvPicPr>
@@ -9816,7 +9816,7 @@
       </p:pic>
       <p:pic>
         <p:nvPicPr>
-          <p:cNvPr id="862070677" name="Immagine 21"/>
+          <p:cNvPr id="483239441" name="Immagine 21"/>
           <p:cNvPicPr>
             <a:picLocks noChangeAspect="1"/>
           </p:cNvPicPr>
@@ -10262,7 +10262,7 @@
       </p:grpSpPr>
       <p:sp>
         <p:nvSpPr>
-          <p:cNvPr id="502494603" name="Title 1"/>
+          <p:cNvPr id="844008209" name="Title 1"/>
           <p:cNvSpPr>
             <a:spLocks noGrp="1"/>
           </p:cNvSpPr>
@@ -10297,7 +10297,7 @@
       </p:sp>
       <p:sp>
         <p:nvSpPr>
-          <p:cNvPr id="2081207716" name="Text Placeholder 2"/>
+          <p:cNvPr id="794369372" name="Text Placeholder 2"/>
           <p:cNvSpPr>
             <a:spLocks noGrp="1"/>
           </p:cNvSpPr>
@@ -10323,7 +10323,7 @@
       </p:sp>
       <p:sp>
         <p:nvSpPr>
-          <p:cNvPr id="772835437" name="Text Placeholder 3"/>
+          <p:cNvPr id="1170220872" name="Text Placeholder 3"/>
           <p:cNvSpPr>
             <a:spLocks noGrp="1"/>
           </p:cNvSpPr>
@@ -10345,7 +10345,7 @@
       </p:sp>
       <p:sp>
         <p:nvSpPr>
-          <p:cNvPr id="1413954916" name="Text Placeholder 4"/>
+          <p:cNvPr id="1610320957" name="Text Placeholder 4"/>
           <p:cNvSpPr>
             <a:spLocks noGrp="1"/>
           </p:cNvSpPr>
@@ -10378,7 +10378,7 @@
       </p:sp>
       <p:sp>
         <p:nvSpPr>
-          <p:cNvPr id="587741602" name="Text Placeholder 5"/>
+          <p:cNvPr id="671787455" name="Text Placeholder 5"/>
           <p:cNvSpPr>
             <a:spLocks noGrp="1"/>
           </p:cNvSpPr>
@@ -10400,7 +10400,7 @@
       </p:sp>
       <p:sp>
         <p:nvSpPr>
-          <p:cNvPr id="7516084" name="Text Placeholder 6"/>
+          <p:cNvPr id="776992075" name="Text Placeholder 6"/>
           <p:cNvSpPr>
             <a:spLocks noGrp="1"/>
           </p:cNvSpPr>
@@ -10422,7 +10422,7 @@
       </p:sp>
       <p:sp>
         <p:nvSpPr>
-          <p:cNvPr id="448024018" name="Text Placeholder 7"/>
+          <p:cNvPr id="1576806320" name="Text Placeholder 7"/>
           <p:cNvSpPr>
             <a:spLocks noGrp="1"/>
           </p:cNvSpPr>
@@ -10455,7 +10455,7 @@
       </p:sp>
       <p:sp>
         <p:nvSpPr>
-          <p:cNvPr id="1253070550" name="Text Placeholder 8"/>
+          <p:cNvPr id="573971407" name="Text Placeholder 8"/>
           <p:cNvSpPr>
             <a:spLocks noGrp="1"/>
           </p:cNvSpPr>
@@ -10477,7 +10477,7 @@
       </p:sp>
       <p:sp>
         <p:nvSpPr>
-          <p:cNvPr id="185771837" name="Text Placeholder 9"/>
+          <p:cNvPr id="317072156" name="Text Placeholder 9"/>
           <p:cNvSpPr>
             <a:spLocks noGrp="1"/>
           </p:cNvSpPr>
@@ -10503,7 +10503,7 @@
       </p:sp>
       <p:sp>
         <p:nvSpPr>
-          <p:cNvPr id="2031598164" name="Text Placeholder 10"/>
+          <p:cNvPr id="972062267" name="Text Placeholder 10"/>
           <p:cNvSpPr>
             <a:spLocks noGrp="1"/>
           </p:cNvSpPr>
@@ -10529,7 +10529,7 @@
       </p:sp>
       <p:sp>
         <p:nvSpPr>
-          <p:cNvPr id="494977922" name="Text Placeholder 11"/>
+          <p:cNvPr id="1565270712" name="Text Placeholder 11"/>
           <p:cNvSpPr>
             <a:spLocks noGrp="1"/>
           </p:cNvSpPr>
@@ -10551,7 +10551,7 @@
       </p:sp>
       <p:sp>
         <p:nvSpPr>
-          <p:cNvPr id="2061106863" name="Text Placeholder 12"/>
+          <p:cNvPr id="1578627295" name="Text Placeholder 12"/>
           <p:cNvSpPr>
             <a:spLocks noGrp="1"/>
           </p:cNvSpPr>
@@ -10573,7 +10573,7 @@
       </p:sp>
       <p:sp>
         <p:nvSpPr>
-          <p:cNvPr id="1872871641" name="Text Placeholder 13"/>
+          <p:cNvPr id="1361628289" name="Text Placeholder 13"/>
           <p:cNvSpPr>
             <a:spLocks noGrp="1"/>
           </p:cNvSpPr>
@@ -10599,7 +10599,7 @@
       </p:sp>
       <p:sp>
         <p:nvSpPr>
-          <p:cNvPr id="2013628075" name="Text Placeholder 14"/>
+          <p:cNvPr id="1332363842" name="Text Placeholder 14"/>
           <p:cNvSpPr>
             <a:spLocks noGrp="1"/>
           </p:cNvSpPr>
@@ -10621,7 +10621,7 @@
       </p:sp>
       <p:sp>
         <p:nvSpPr>
-          <p:cNvPr id="1527429124" name="Text Placeholder 15"/>
+          <p:cNvPr id="2090754165" name="Text Placeholder 15"/>
           <p:cNvSpPr>
             <a:spLocks noGrp="1"/>
           </p:cNvSpPr>
@@ -10647,7 +10647,7 @@
       </p:sp>
       <p:sp>
         <p:nvSpPr>
-          <p:cNvPr id="1000739986" name="Text Placeholder 16"/>
+          <p:cNvPr id="75267595" name="Text Placeholder 16"/>
           <p:cNvSpPr>
             <a:spLocks noGrp="1"/>
           </p:cNvSpPr>
@@ -10673,7 +10673,7 @@
       </p:sp>
       <p:sp>
         <p:nvSpPr>
-          <p:cNvPr id="1218178395" name="Text Placeholder 17"/>
+          <p:cNvPr id="244176548" name="Text Placeholder 17"/>
           <p:cNvSpPr>
             <a:spLocks noGrp="1"/>
           </p:cNvSpPr>
@@ -10695,7 +10695,7 @@
       </p:sp>
       <p:sp>
         <p:nvSpPr>
-          <p:cNvPr id="1997666425" name="Text Placeholder 18"/>
+          <p:cNvPr id="2026142420" name="Text Placeholder 18"/>
           <p:cNvSpPr>
             <a:spLocks noGrp="1"/>
           </p:cNvSpPr>
@@ -10790,7 +10790,7 @@
       </p:grpSpPr>
       <p:pic>
         <p:nvPicPr>
-          <p:cNvPr id="592553103" name=""/>
+          <p:cNvPr id="1650117561" name=""/>
           <p:cNvPicPr>
             <a:picLocks noChangeAspect="1"/>
           </p:cNvPicPr>
@@ -10812,7 +10812,7 @@
       </p:pic>
       <p:sp>
         <p:nvSpPr>
-          <p:cNvPr id="1660496564" name=""/>
+          <p:cNvPr id="328392461" name=""/>
           <p:cNvSpPr txBox="1"/>
           <p:nvPr/>
         </p:nvSpPr>
@@ -10840,7 +10840,7 @@
       </p:sp>
       <p:pic>
         <p:nvPicPr>
-          <p:cNvPr id="2083266697" name=""/>
+          <p:cNvPr id="323090269" name=""/>
           <p:cNvPicPr>
             <a:picLocks noChangeAspect="1"/>
           </p:cNvPicPr>
@@ -10862,7 +10862,7 @@
       </p:pic>
       <p:sp>
         <p:nvSpPr>
-          <p:cNvPr id="1775941387" name="Text Placeholder 1"/>
+          <p:cNvPr id="174431090" name="Text Placeholder 1"/>
           <p:cNvSpPr>
             <a:spLocks noGrp="1"/>
           </p:cNvSpPr>
@@ -10908,7 +10908,7 @@
       </p:sp>
       <p:pic>
         <p:nvPicPr>
-          <p:cNvPr id="1521993739" name="Picture 679748627"/>
+          <p:cNvPr id="2078113370" name="Picture 679748627"/>
           <p:cNvPicPr>
             <a:picLocks noChangeAspect="1"/>
           </p:cNvPicPr>
@@ -10930,7 +10930,7 @@
       </p:pic>
       <p:pic>
         <p:nvPicPr>
-          <p:cNvPr id="741046501" name=""/>
+          <p:cNvPr id="502327241" name=""/>
           <p:cNvPicPr>
             <a:picLocks noChangeAspect="1"/>
           </p:cNvPicPr>
@@ -10952,7 +10952,7 @@
       </p:pic>
       <p:sp>
         <p:nvSpPr>
-          <p:cNvPr id="50415414" name=""/>
+          <p:cNvPr id="382101029" name=""/>
           <p:cNvSpPr txBox="1"/>
           <p:nvPr/>
         </p:nvSpPr>
@@ -10993,7 +10993,7 @@
       </p:sp>
       <p:sp>
         <p:nvSpPr>
-          <p:cNvPr id="1514497372" name=""/>
+          <p:cNvPr id="426609116" name=""/>
           <p:cNvSpPr txBox="1"/>
           <p:nvPr/>
         </p:nvSpPr>
@@ -11069,7 +11069,7 @@
       </p:grpSpPr>
       <p:pic>
         <p:nvPicPr>
-          <p:cNvPr id="1862934097" name=""/>
+          <p:cNvPr id="1380770488" name=""/>
           <p:cNvPicPr>
             <a:picLocks noChangeAspect="1"/>
           </p:cNvPicPr>
@@ -11091,7 +11091,7 @@
       </p:pic>
       <p:sp>
         <p:nvSpPr>
-          <p:cNvPr id="2123275802" name=""/>
+          <p:cNvPr id="1098178650" name=""/>
           <p:cNvSpPr txBox="1"/>
           <p:nvPr/>
         </p:nvSpPr>
@@ -11119,7 +11119,7 @@
       </p:sp>
       <p:pic>
         <p:nvPicPr>
-          <p:cNvPr id="435873875" name=""/>
+          <p:cNvPr id="2015270441" name=""/>
           <p:cNvPicPr>
             <a:picLocks noChangeAspect="1"/>
           </p:cNvPicPr>
@@ -11141,7 +11141,7 @@
       </p:pic>
       <p:sp>
         <p:nvSpPr>
-          <p:cNvPr id="1487100613" name="Text Placeholder 1"/>
+          <p:cNvPr id="829860218" name="Text Placeholder 1"/>
           <p:cNvSpPr>
             <a:spLocks noGrp="1"/>
           </p:cNvSpPr>
@@ -11187,7 +11187,7 @@
       </p:sp>
       <p:pic>
         <p:nvPicPr>
-          <p:cNvPr id="155868967" name="Picture 679748627"/>
+          <p:cNvPr id="881736826" name="Picture 679748627"/>
           <p:cNvPicPr>
             <a:picLocks noChangeAspect="1"/>
           </p:cNvPicPr>
@@ -11210,7 +11210,7 @@
       </p:pic>
       <p:pic>
         <p:nvPicPr>
-          <p:cNvPr id="1667004412" name=""/>
+          <p:cNvPr id="1911464991" name=""/>
           <p:cNvPicPr>
             <a:picLocks noChangeAspect="1"/>
           </p:cNvPicPr>
@@ -11232,7 +11232,7 @@
       </p:pic>
       <p:pic>
         <p:nvPicPr>
-          <p:cNvPr id="1043014842" name=""/>
+          <p:cNvPr id="1460250493" name=""/>
           <p:cNvPicPr>
             <a:picLocks noChangeAspect="1"/>
           </p:cNvPicPr>
@@ -11255,7 +11255,7 @@
       </p:pic>
       <p:sp>
         <p:nvSpPr>
-          <p:cNvPr id="1020561536" name=""/>
+          <p:cNvPr id="1639189493" name=""/>
           <p:cNvSpPr txBox="1"/>
           <p:nvPr/>
         </p:nvSpPr>
@@ -11296,7 +11296,7 @@
       </p:sp>
       <p:sp>
         <p:nvSpPr>
-          <p:cNvPr id="155815772" name=""/>
+          <p:cNvPr id="1255833658" name=""/>
           <p:cNvSpPr txBox="1"/>
           <p:nvPr/>
         </p:nvSpPr>
@@ -11337,7 +11337,7 @@
       </p:sp>
       <p:sp>
         <p:nvSpPr>
-          <p:cNvPr id="758632122" name=""/>
+          <p:cNvPr id="1094167289" name=""/>
           <p:cNvSpPr txBox="1"/>
           <p:nvPr/>
         </p:nvSpPr>
@@ -11413,7 +11413,7 @@
       </p:grpSpPr>
       <p:pic>
         <p:nvPicPr>
-          <p:cNvPr id="552100674" name=""/>
+          <p:cNvPr id="789509415" name=""/>
           <p:cNvPicPr>
             <a:picLocks noChangeAspect="1"/>
           </p:cNvPicPr>
@@ -11435,7 +11435,7 @@
       </p:pic>
       <p:sp>
         <p:nvSpPr>
-          <p:cNvPr id="1701292651" name=""/>
+          <p:cNvPr id="1578751269" name=""/>
           <p:cNvSpPr txBox="1"/>
           <p:nvPr/>
         </p:nvSpPr>
@@ -11463,7 +11463,7 @@
       </p:sp>
       <p:pic>
         <p:nvPicPr>
-          <p:cNvPr id="1392613618" name=""/>
+          <p:cNvPr id="1630323314" name=""/>
           <p:cNvPicPr>
             <a:picLocks noChangeAspect="1"/>
           </p:cNvPicPr>
@@ -11485,7 +11485,7 @@
       </p:pic>
       <p:sp>
         <p:nvSpPr>
-          <p:cNvPr id="1645716868" name="Text Placeholder 1"/>
+          <p:cNvPr id="461947584" name="Text Placeholder 1"/>
           <p:cNvSpPr>
             <a:spLocks noGrp="1"/>
           </p:cNvSpPr>
@@ -11531,7 +11531,7 @@
       </p:sp>
       <p:pic>
         <p:nvPicPr>
-          <p:cNvPr id="961175794" name="Picture 679748627"/>
+          <p:cNvPr id="453214216" name="Picture 679748627"/>
           <p:cNvPicPr>
             <a:picLocks noChangeAspect="1"/>
           </p:cNvPicPr>
@@ -11554,7 +11554,7 @@
       </p:pic>
       <p:pic>
         <p:nvPicPr>
-          <p:cNvPr id="485980487" name=""/>
+          <p:cNvPr id="412733931" name=""/>
           <p:cNvPicPr>
             <a:picLocks noChangeAspect="1"/>
           </p:cNvPicPr>
@@ -11576,7 +11576,7 @@
       </p:pic>
       <p:pic>
         <p:nvPicPr>
-          <p:cNvPr id="1179368362" name=""/>
+          <p:cNvPr id="2075337411" name=""/>
           <p:cNvPicPr>
             <a:picLocks noChangeAspect="1"/>
           </p:cNvPicPr>
@@ -11599,7 +11599,7 @@
       </p:pic>
       <p:sp>
         <p:nvSpPr>
-          <p:cNvPr id="441362030" name=""/>
+          <p:cNvPr id="261463867" name=""/>
           <p:cNvSpPr txBox="1"/>
           <p:nvPr/>
         </p:nvSpPr>
@@ -11677,7 +11677,7 @@
       </p:grpSpPr>
       <p:pic>
         <p:nvPicPr>
-          <p:cNvPr id="2144416124" name=""/>
+          <p:cNvPr id="256148895" name=""/>
           <p:cNvPicPr>
             <a:picLocks noChangeAspect="1"/>
           </p:cNvPicPr>
@@ -11699,7 +11699,7 @@
       </p:pic>
       <p:sp>
         <p:nvSpPr>
-          <p:cNvPr id="1166287525" name=""/>
+          <p:cNvPr id="181563186" name=""/>
           <p:cNvSpPr txBox="1"/>
           <p:nvPr/>
         </p:nvSpPr>
@@ -11727,7 +11727,7 @@
       </p:sp>
       <p:pic>
         <p:nvPicPr>
-          <p:cNvPr id="120310628" name=""/>
+          <p:cNvPr id="508929441" name=""/>
           <p:cNvPicPr>
             <a:picLocks noChangeAspect="1"/>
           </p:cNvPicPr>
@@ -11749,7 +11749,7 @@
       </p:pic>
       <p:sp>
         <p:nvSpPr>
-          <p:cNvPr id="1811413322" name="Text Placeholder 1"/>
+          <p:cNvPr id="2034878086" name="Text Placeholder 1"/>
           <p:cNvSpPr>
             <a:spLocks noGrp="1"/>
           </p:cNvSpPr>
@@ -11789,7 +11789,7 @@
       </p:sp>
       <p:pic>
         <p:nvPicPr>
-          <p:cNvPr id="970103102" name="Picture 679748627"/>
+          <p:cNvPr id="305067320" name="Picture 679748627"/>
           <p:cNvPicPr>
             <a:picLocks noChangeAspect="1"/>
           </p:cNvPicPr>
@@ -11812,7 +11812,7 @@
       </p:pic>
       <p:pic>
         <p:nvPicPr>
-          <p:cNvPr id="1442605098" name=""/>
+          <p:cNvPr id="1182181737" name=""/>
           <p:cNvPicPr>
             <a:picLocks noChangeAspect="1"/>
           </p:cNvPicPr>
@@ -11834,7 +11834,7 @@
       </p:pic>
       <p:pic>
         <p:nvPicPr>
-          <p:cNvPr id="1604405901" name=""/>
+          <p:cNvPr id="395233290" name=""/>
           <p:cNvPicPr>
             <a:picLocks noChangeAspect="1"/>
           </p:cNvPicPr>
@@ -11857,7 +11857,7 @@
       </p:pic>
       <p:pic>
         <p:nvPicPr>
-          <p:cNvPr id="315616803" name=""/>
+          <p:cNvPr id="1314321328" name=""/>
           <p:cNvPicPr>
             <a:picLocks noChangeAspect="1"/>
           </p:cNvPicPr>
@@ -11879,7 +11879,7 @@
       </p:pic>
       <p:pic>
         <p:nvPicPr>
-          <p:cNvPr id="466952742" name=""/>
+          <p:cNvPr id="967613813" name=""/>
           <p:cNvPicPr>
             <a:picLocks noChangeAspect="1"/>
           </p:cNvPicPr>
@@ -11938,7 +11938,7 @@
       </p:grpSpPr>
       <p:pic>
         <p:nvPicPr>
-          <p:cNvPr id="534477430" name=""/>
+          <p:cNvPr id="1581447137" name=""/>
           <p:cNvPicPr>
             <a:picLocks noChangeAspect="1"/>
           </p:cNvPicPr>
@@ -11960,7 +11960,7 @@
       </p:pic>
       <p:pic>
         <p:nvPicPr>
-          <p:cNvPr id="187946054" name=""/>
+          <p:cNvPr id="2055464237" name=""/>
           <p:cNvPicPr>
             <a:picLocks noChangeAspect="1"/>
           </p:cNvPicPr>
@@ -11982,7 +11982,7 @@
       </p:pic>
       <p:sp>
         <p:nvSpPr>
-          <p:cNvPr id="520165006" name=""/>
+          <p:cNvPr id="1427023714" name=""/>
           <p:cNvSpPr txBox="1"/>
           <p:nvPr/>
         </p:nvSpPr>
@@ -12010,7 +12010,7 @@
       </p:sp>
       <p:pic>
         <p:nvPicPr>
-          <p:cNvPr id="313121940" name=""/>
+          <p:cNvPr id="1160985174" name=""/>
           <p:cNvPicPr>
             <a:picLocks noChangeAspect="1"/>
           </p:cNvPicPr>
@@ -12032,7 +12032,7 @@
       </p:pic>
       <p:sp>
         <p:nvSpPr>
-          <p:cNvPr id="1819985608" name="Text Placeholder 1"/>
+          <p:cNvPr id="737843044" name="Text Placeholder 1"/>
           <p:cNvSpPr>
             <a:spLocks noGrp="1"/>
           </p:cNvSpPr>
@@ -12072,7 +12072,7 @@
       </p:sp>
       <p:pic>
         <p:nvPicPr>
-          <p:cNvPr id="88989350" name="Picture 679748627"/>
+          <p:cNvPr id="730140372" name="Picture 679748627"/>
           <p:cNvPicPr>
             <a:picLocks noChangeAspect="1"/>
           </p:cNvPicPr>
@@ -12095,7 +12095,7 @@
       </p:pic>
       <p:pic>
         <p:nvPicPr>
-          <p:cNvPr id="839897080" name=""/>
+          <p:cNvPr id="635461164" name=""/>
           <p:cNvPicPr>
             <a:picLocks noChangeAspect="1"/>
           </p:cNvPicPr>
@@ -12117,7 +12117,7 @@
       </p:pic>
       <p:pic>
         <p:nvPicPr>
-          <p:cNvPr id="1033049306" name=""/>
+          <p:cNvPr id="715891332" name=""/>
           <p:cNvPicPr>
             <a:picLocks noChangeAspect="1"/>
           </p:cNvPicPr>
@@ -12140,7 +12140,7 @@
       </p:pic>
       <p:pic>
         <p:nvPicPr>
-          <p:cNvPr id="1712408249" name=""/>
+          <p:cNvPr id="1320772269" name=""/>
           <p:cNvPicPr>
             <a:picLocks noChangeAspect="1"/>
           </p:cNvPicPr>
@@ -12162,7 +12162,7 @@
       </p:pic>
       <p:pic>
         <p:nvPicPr>
-          <p:cNvPr id="1596458993" name=""/>
+          <p:cNvPr id="594709559" name=""/>
           <p:cNvPicPr>
             <a:picLocks noChangeAspect="1"/>
           </p:cNvPicPr>
@@ -12184,7 +12184,7 @@
       </p:pic>
       <p:pic>
         <p:nvPicPr>
-          <p:cNvPr id="554442530" name=""/>
+          <p:cNvPr id="306740111" name=""/>
           <p:cNvPicPr>
             <a:picLocks noChangeAspect="1"/>
           </p:cNvPicPr>
@@ -12206,7 +12206,7 @@
       </p:pic>
       <p:pic>
         <p:nvPicPr>
-          <p:cNvPr id="745283809" name=""/>
+          <p:cNvPr id="1613627833" name=""/>
           <p:cNvPicPr>
             <a:picLocks noChangeAspect="1"/>
           </p:cNvPicPr>
@@ -12228,7 +12228,7 @@
       </p:pic>
       <p:pic>
         <p:nvPicPr>
-          <p:cNvPr id="231621897" name=""/>
+          <p:cNvPr id="71340906" name=""/>
           <p:cNvPicPr>
             <a:picLocks noChangeAspect="1"/>
           </p:cNvPicPr>
@@ -12251,7 +12251,7 @@
       </p:pic>
       <p:pic>
         <p:nvPicPr>
-          <p:cNvPr id="457169139" name=""/>
+          <p:cNvPr id="222761026" name=""/>
           <p:cNvPicPr>
             <a:picLocks noChangeAspect="1"/>
           </p:cNvPicPr>
@@ -12273,7 +12273,7 @@
       </p:pic>
       <p:pic>
         <p:nvPicPr>
-          <p:cNvPr id="152150090" name=""/>
+          <p:cNvPr id="204679351" name=""/>
           <p:cNvPicPr>
             <a:picLocks noChangeAspect="1"/>
           </p:cNvPicPr>
@@ -12295,7 +12295,7 @@
       </p:pic>
       <p:pic>
         <p:nvPicPr>
-          <p:cNvPr id="1974038548" name=""/>
+          <p:cNvPr id="474923198" name=""/>
           <p:cNvPicPr>
             <a:picLocks noChangeAspect="1"/>
           </p:cNvPicPr>
@@ -12317,7 +12317,7 @@
       </p:pic>
       <p:pic>
         <p:nvPicPr>
-          <p:cNvPr id="302248405" name=""/>
+          <p:cNvPr id="133607641" name=""/>
           <p:cNvPicPr>
             <a:picLocks noChangeAspect="1"/>
           </p:cNvPicPr>
@@ -12340,7 +12340,7 @@
       </p:pic>
       <p:sp>
         <p:nvSpPr>
-          <p:cNvPr id="643754676" name="Text Placeholder 1"/>
+          <p:cNvPr id="2041262718" name="Text Placeholder 1"/>
           <p:cNvSpPr>
             <a:spLocks noGrp="1"/>
           </p:cNvSpPr>
@@ -12536,7 +12536,7 @@
       </p:sp>
       <p:sp>
         <p:nvSpPr>
-          <p:cNvPr id="865479893" name="Text Placeholder 1"/>
+          <p:cNvPr id="916740129" name="Text Placeholder 1"/>
           <p:cNvSpPr>
             <a:spLocks noGrp="1"/>
           </p:cNvSpPr>
@@ -12732,7 +12732,7 @@
       </p:sp>
       <p:pic>
         <p:nvPicPr>
-          <p:cNvPr id="1508708967" name=""/>
+          <p:cNvPr id="1549107935" name=""/>
           <p:cNvPicPr>
             <a:picLocks noChangeAspect="1"/>
           </p:cNvPicPr>
@@ -12754,7 +12754,7 @@
       </p:pic>
       <p:sp>
         <p:nvSpPr>
-          <p:cNvPr id="1688161498" name="Text Placeholder 1"/>
+          <p:cNvPr id="1351961937" name="Text Placeholder 1"/>
           <p:cNvSpPr>
             <a:spLocks noGrp="1"/>
           </p:cNvSpPr>
@@ -12984,7 +12984,7 @@
       </p:sp>
       <p:pic>
         <p:nvPicPr>
-          <p:cNvPr id="216233298" name=""/>
+          <p:cNvPr id="1834347274" name=""/>
           <p:cNvPicPr>
             <a:picLocks noChangeAspect="1"/>
           </p:cNvPicPr>
@@ -13171,7 +13171,7 @@
       </p:grpSpPr>
       <p:pic>
         <p:nvPicPr>
-          <p:cNvPr id="2098268867" name=""/>
+          <p:cNvPr id="2132423342" name=""/>
           <p:cNvPicPr>
             <a:picLocks noChangeAspect="1"/>
           </p:cNvPicPr>
@@ -13193,7 +13193,7 @@
       </p:pic>
       <p:sp>
         <p:nvSpPr>
-          <p:cNvPr id="665015212" name=""/>
+          <p:cNvPr id="1206953234" name=""/>
           <p:cNvSpPr txBox="1"/>
           <p:nvPr/>
         </p:nvSpPr>
@@ -13221,7 +13221,7 @@
       </p:sp>
       <p:pic>
         <p:nvPicPr>
-          <p:cNvPr id="726217141" name=""/>
+          <p:cNvPr id="89350807" name=""/>
           <p:cNvPicPr>
             <a:picLocks noChangeAspect="1"/>
           </p:cNvPicPr>
@@ -13243,7 +13243,7 @@
       </p:pic>
       <p:sp>
         <p:nvSpPr>
-          <p:cNvPr id="1030684915" name="Text Placeholder 1"/>
+          <p:cNvPr id="1758716213" name="Text Placeholder 1"/>
           <p:cNvSpPr>
             <a:spLocks noGrp="1"/>
           </p:cNvSpPr>
@@ -13289,7 +13289,7 @@
       </p:sp>
       <p:pic>
         <p:nvPicPr>
-          <p:cNvPr id="1765951603" name="Picture 679748627"/>
+          <p:cNvPr id="365321842" name="Picture 679748627"/>
           <p:cNvPicPr>
             <a:picLocks noChangeAspect="1"/>
           </p:cNvPicPr>
@@ -13312,7 +13312,7 @@
       </p:pic>
       <p:pic>
         <p:nvPicPr>
-          <p:cNvPr id="56417503" name=""/>
+          <p:cNvPr id="732464140" name=""/>
           <p:cNvPicPr>
             <a:picLocks noChangeAspect="1"/>
           </p:cNvPicPr>
@@ -13334,7 +13334,7 @@
       </p:pic>
       <p:pic>
         <p:nvPicPr>
-          <p:cNvPr id="919967234" name=""/>
+          <p:cNvPr id="479573233" name=""/>
           <p:cNvPicPr>
             <a:picLocks noChangeAspect="1"/>
           </p:cNvPicPr>
@@ -13357,7 +13357,7 @@
       </p:pic>
       <p:sp>
         <p:nvSpPr>
-          <p:cNvPr id="1328630131" name=""/>
+          <p:cNvPr id="245005175" name=""/>
           <p:cNvSpPr txBox="1"/>
           <p:nvPr/>
         </p:nvSpPr>
@@ -13398,7 +13398,7 @@
       </p:sp>
       <p:sp>
         <p:nvSpPr>
-          <p:cNvPr id="1589955350" name=""/>
+          <p:cNvPr id="269598961" name=""/>
           <p:cNvSpPr txBox="1"/>
           <p:nvPr/>
         </p:nvSpPr>
@@ -13441,7 +13441,7 @@
       </p:sp>
       <p:sp>
         <p:nvSpPr>
-          <p:cNvPr id="908475243" name=""/>
+          <p:cNvPr id="258657985" name=""/>
           <p:cNvSpPr txBox="1"/>
           <p:nvPr/>
         </p:nvSpPr>
@@ -13519,7 +13519,7 @@
       </p:grpSpPr>
       <p:pic>
         <p:nvPicPr>
-          <p:cNvPr id="1147385478" name=""/>
+          <p:cNvPr id="274036840" name=""/>
           <p:cNvPicPr>
             <a:picLocks noChangeAspect="1"/>
           </p:cNvPicPr>
@@ -13541,7 +13541,7 @@
       </p:pic>
       <p:sp>
         <p:nvSpPr>
-          <p:cNvPr id="1609806723" name=""/>
+          <p:cNvPr id="1862079667" name=""/>
           <p:cNvSpPr txBox="1"/>
           <p:nvPr/>
         </p:nvSpPr>
@@ -13569,7 +13569,7 @@
       </p:sp>
       <p:pic>
         <p:nvPicPr>
-          <p:cNvPr id="1886561732" name=""/>
+          <p:cNvPr id="981496311" name=""/>
           <p:cNvPicPr>
             <a:picLocks noChangeAspect="1"/>
           </p:cNvPicPr>
@@ -13591,7 +13591,7 @@
       </p:pic>
       <p:sp>
         <p:nvSpPr>
-          <p:cNvPr id="1142940768" name="Text Placeholder 1"/>
+          <p:cNvPr id="575305404" name="Text Placeholder 1"/>
           <p:cNvSpPr>
             <a:spLocks noGrp="1"/>
           </p:cNvSpPr>
@@ -13637,7 +13637,7 @@
       </p:sp>
       <p:pic>
         <p:nvPicPr>
-          <p:cNvPr id="1340571446" name="Picture 679748627"/>
+          <p:cNvPr id="2094321888" name="Picture 679748627"/>
           <p:cNvPicPr>
             <a:picLocks noChangeAspect="1"/>
           </p:cNvPicPr>
@@ -13660,7 +13660,7 @@
       </p:pic>
       <p:pic>
         <p:nvPicPr>
-          <p:cNvPr id="264526489" name=""/>
+          <p:cNvPr id="1136362230" name=""/>
           <p:cNvPicPr>
             <a:picLocks noChangeAspect="1"/>
           </p:cNvPicPr>
@@ -13682,7 +13682,7 @@
       </p:pic>
       <p:pic>
         <p:nvPicPr>
-          <p:cNvPr id="2111188464" name=""/>
+          <p:cNvPr id="1338793104" name=""/>
           <p:cNvPicPr>
             <a:picLocks noChangeAspect="1"/>
           </p:cNvPicPr>
@@ -13705,7 +13705,7 @@
       </p:pic>
       <p:pic>
         <p:nvPicPr>
-          <p:cNvPr id="1256113748" name=""/>
+          <p:cNvPr id="1450601800" name=""/>
           <p:cNvPicPr>
             <a:picLocks noChangeAspect="1"/>
           </p:cNvPicPr>
@@ -13727,7 +13727,7 @@
       </p:pic>
       <p:sp>
         <p:nvSpPr>
-          <p:cNvPr id="138823927" name=""/>
+          <p:cNvPr id="1657374082" name=""/>
           <p:cNvSpPr txBox="1"/>
           <p:nvPr/>
         </p:nvSpPr>
@@ -13768,7 +13768,7 @@
       </p:sp>
       <p:sp>
         <p:nvSpPr>
-          <p:cNvPr id="1656746792" name=""/>
+          <p:cNvPr id="1554138842" name=""/>
           <p:cNvSpPr txBox="1"/>
           <p:nvPr/>
         </p:nvSpPr>
@@ -13809,7 +13809,7 @@
       </p:sp>
       <p:sp>
         <p:nvSpPr>
-          <p:cNvPr id="1923069289" name=""/>
+          <p:cNvPr id="1818076252" name=""/>
           <p:cNvSpPr txBox="1"/>
           <p:nvPr/>
         </p:nvSpPr>
@@ -13850,7 +13850,7 @@
       </p:sp>
       <p:sp>
         <p:nvSpPr>
-          <p:cNvPr id="532084555" name=""/>
+          <p:cNvPr id="1243005651" name=""/>
           <p:cNvSpPr txBox="1"/>
           <p:nvPr/>
         </p:nvSpPr>
@@ -13926,7 +13926,7 @@
       </p:grpSpPr>
       <p:pic>
         <p:nvPicPr>
-          <p:cNvPr id="752035740" name=""/>
+          <p:cNvPr id="1339815102" name=""/>
           <p:cNvPicPr>
             <a:picLocks noChangeAspect="1"/>
           </p:cNvPicPr>
@@ -13948,7 +13948,7 @@
       </p:pic>
       <p:sp>
         <p:nvSpPr>
-          <p:cNvPr id="1821472345" name=""/>
+          <p:cNvPr id="610725623" name=""/>
           <p:cNvSpPr txBox="1"/>
           <p:nvPr/>
         </p:nvSpPr>
@@ -13976,7 +13976,7 @@
       </p:sp>
       <p:pic>
         <p:nvPicPr>
-          <p:cNvPr id="412583500" name=""/>
+          <p:cNvPr id="198253947" name=""/>
           <p:cNvPicPr>
             <a:picLocks noChangeAspect="1"/>
           </p:cNvPicPr>
@@ -13998,7 +13998,7 @@
       </p:pic>
       <p:sp>
         <p:nvSpPr>
-          <p:cNvPr id="443396020" name="Text Placeholder 1"/>
+          <p:cNvPr id="732638764" name="Text Placeholder 1"/>
           <p:cNvSpPr>
             <a:spLocks noGrp="1"/>
           </p:cNvSpPr>
@@ -14029,7 +14029,7 @@
       </p:sp>
       <p:pic>
         <p:nvPicPr>
-          <p:cNvPr id="1185102197" name="Picture 679748627"/>
+          <p:cNvPr id="1326766099" name="Picture 679748627"/>
           <p:cNvPicPr>
             <a:picLocks noChangeAspect="1"/>
           </p:cNvPicPr>
@@ -14052,7 +14052,7 @@
       </p:pic>
       <p:pic>
         <p:nvPicPr>
-          <p:cNvPr id="1010279234" name=""/>
+          <p:cNvPr id="1873869738" name=""/>
           <p:cNvPicPr>
             <a:picLocks noChangeAspect="1"/>
           </p:cNvPicPr>
@@ -14074,7 +14074,7 @@
       </p:pic>
       <p:pic>
         <p:nvPicPr>
-          <p:cNvPr id="546838885" name=""/>
+          <p:cNvPr id="1847175298" name=""/>
           <p:cNvPicPr>
             <a:picLocks noChangeAspect="1"/>
           </p:cNvPicPr>
@@ -14097,7 +14097,7 @@
       </p:pic>
       <p:pic>
         <p:nvPicPr>
-          <p:cNvPr id="428637312" name=""/>
+          <p:cNvPr id="318338508" name=""/>
           <p:cNvPicPr>
             <a:picLocks noChangeAspect="1"/>
           </p:cNvPicPr>
@@ -14119,7 +14119,7 @@
       </p:pic>
       <p:pic>
         <p:nvPicPr>
-          <p:cNvPr id="1530528990" name=""/>
+          <p:cNvPr id="628709972" name=""/>
           <p:cNvPicPr>
             <a:picLocks noChangeAspect="1"/>
           </p:cNvPicPr>
@@ -14141,7 +14141,7 @@
       </p:pic>
       <p:sp>
         <p:nvSpPr>
-          <p:cNvPr id="255239912" name=""/>
+          <p:cNvPr id="15622249" name=""/>
           <p:cNvSpPr txBox="1"/>
           <p:nvPr/>
         </p:nvSpPr>
@@ -14180,7 +14180,7 @@
       </p:sp>
       <p:sp>
         <p:nvSpPr>
-          <p:cNvPr id="507993182" name=""/>
+          <p:cNvPr id="893235453" name=""/>
           <p:cNvSpPr txBox="1"/>
           <p:nvPr/>
         </p:nvSpPr>
@@ -14219,7 +14219,7 @@
       </p:sp>
       <p:sp>
         <p:nvSpPr>
-          <p:cNvPr id="658497451" name=""/>
+          <p:cNvPr id="1814640948" name=""/>
           <p:cNvSpPr txBox="1"/>
           <p:nvPr/>
         </p:nvSpPr>
@@ -14282,7 +14282,7 @@
       </p:sp>
       <p:sp>
         <p:nvSpPr>
-          <p:cNvPr id="557119187" name=""/>
+          <p:cNvPr id="143140952" name=""/>
           <p:cNvSpPr txBox="1"/>
           <p:nvPr/>
         </p:nvSpPr>
@@ -14382,7 +14382,7 @@
       </p:grpSpPr>
       <p:pic>
         <p:nvPicPr>
-          <p:cNvPr id="1063416804" name=""/>
+          <p:cNvPr id="1365105280" name=""/>
           <p:cNvPicPr>
             <a:picLocks noChangeAspect="1"/>
           </p:cNvPicPr>
@@ -14404,7 +14404,7 @@
       </p:pic>
       <p:sp>
         <p:nvSpPr>
-          <p:cNvPr id="2099055173" name=""/>
+          <p:cNvPr id="128511964" name=""/>
           <p:cNvSpPr txBox="1"/>
           <p:nvPr/>
         </p:nvSpPr>
@@ -14432,7 +14432,7 @@
       </p:sp>
       <p:pic>
         <p:nvPicPr>
-          <p:cNvPr id="1577758797" name=""/>
+          <p:cNvPr id="585061600" name=""/>
           <p:cNvPicPr>
             <a:picLocks noChangeAspect="1"/>
           </p:cNvPicPr>
@@ -14454,7 +14454,7 @@
       </p:pic>
       <p:sp>
         <p:nvSpPr>
-          <p:cNvPr id="1125521689" name="Text Placeholder 1"/>
+          <p:cNvPr id="1179329763" name="Text Placeholder 1"/>
           <p:cNvSpPr>
             <a:spLocks noGrp="1"/>
           </p:cNvSpPr>
@@ -14500,7 +14500,7 @@
       </p:sp>
       <p:pic>
         <p:nvPicPr>
-          <p:cNvPr id="662389354" name="Picture 679748627"/>
+          <p:cNvPr id="1538835814" name="Picture 679748627"/>
           <p:cNvPicPr>
             <a:picLocks noChangeAspect="1"/>
           </p:cNvPicPr>
@@ -14523,7 +14523,7 @@
       </p:pic>
       <p:pic>
         <p:nvPicPr>
-          <p:cNvPr id="1101759881" name=""/>
+          <p:cNvPr id="1848393723" name=""/>
           <p:cNvPicPr>
             <a:picLocks noChangeAspect="1"/>
           </p:cNvPicPr>
@@ -14545,7 +14545,7 @@
       </p:pic>
       <p:pic>
         <p:nvPicPr>
-          <p:cNvPr id="748426796" name=""/>
+          <p:cNvPr id="1758758790" name=""/>
           <p:cNvPicPr>
             <a:picLocks noChangeAspect="1"/>
           </p:cNvPicPr>
@@ -14568,7 +14568,7 @@
       </p:pic>
       <p:pic>
         <p:nvPicPr>
-          <p:cNvPr id="1790609013" name=""/>
+          <p:cNvPr id="1772125810" name=""/>
           <p:cNvPicPr>
             <a:picLocks noChangeAspect="1"/>
           </p:cNvPicPr>
@@ -14590,7 +14590,7 @@
       </p:pic>
       <p:pic>
         <p:nvPicPr>
-          <p:cNvPr id="1604086286" name=""/>
+          <p:cNvPr id="1698291857" name=""/>
           <p:cNvPicPr>
             <a:picLocks noChangeAspect="1"/>
           </p:cNvPicPr>
@@ -14612,7 +14612,7 @@
       </p:pic>
       <p:sp>
         <p:nvSpPr>
-          <p:cNvPr id="830550597" name=""/>
+          <p:cNvPr id="1877829267" name=""/>
           <p:cNvSpPr txBox="1"/>
           <p:nvPr/>
         </p:nvSpPr>
@@ -14653,7 +14653,7 @@
       </p:sp>
       <p:sp>
         <p:nvSpPr>
-          <p:cNvPr id="73394718" name=""/>
+          <p:cNvPr id="1886068716" name=""/>
           <p:cNvSpPr txBox="1"/>
           <p:nvPr/>
         </p:nvSpPr>
@@ -14694,7 +14694,7 @@
       </p:sp>
       <p:sp>
         <p:nvSpPr>
-          <p:cNvPr id="421380451" name=""/>
+          <p:cNvPr id="217643514" name=""/>
           <p:cNvSpPr txBox="1"/>
           <p:nvPr/>
         </p:nvSpPr>
@@ -14735,7 +14735,7 @@
       </p:sp>
       <p:sp>
         <p:nvSpPr>
-          <p:cNvPr id="197675789" name=""/>
+          <p:cNvPr id="2136829418" name=""/>
           <p:cNvSpPr txBox="1"/>
           <p:nvPr/>
         </p:nvSpPr>
@@ -14776,7 +14776,7 @@
       </p:sp>
       <p:sp>
         <p:nvSpPr>
-          <p:cNvPr id="1221428907" name=""/>
+          <p:cNvPr id="333295315" name=""/>
           <p:cNvSpPr txBox="1"/>
           <p:nvPr/>
         </p:nvSpPr>
@@ -14856,7 +14856,7 @@
       </p:grpSpPr>
       <p:pic>
         <p:nvPicPr>
-          <p:cNvPr id="195584959" name=""/>
+          <p:cNvPr id="543410523" name=""/>
           <p:cNvPicPr>
             <a:picLocks noChangeAspect="1"/>
           </p:cNvPicPr>
@@ -14878,7 +14878,7 @@
       </p:pic>
       <p:pic>
         <p:nvPicPr>
-          <p:cNvPr id="526494989" name=""/>
+          <p:cNvPr id="261317509" name=""/>
           <p:cNvPicPr>
             <a:picLocks noChangeAspect="1"/>
           </p:cNvPicPr>
@@ -14900,7 +14900,7 @@
       </p:pic>
       <p:pic>
         <p:nvPicPr>
-          <p:cNvPr id="1297848905" name=""/>
+          <p:cNvPr id="1539205291" name=""/>
           <p:cNvPicPr>
             <a:picLocks noChangeAspect="1"/>
           </p:cNvPicPr>
@@ -14922,7 +14922,7 @@
       </p:pic>
       <p:sp>
         <p:nvSpPr>
-          <p:cNvPr id="1530804769" name="Text Placeholder 1"/>
+          <p:cNvPr id="1900281524" name="Text Placeholder 1"/>
           <p:cNvSpPr>
             <a:spLocks noGrp="1"/>
           </p:cNvSpPr>
@@ -14953,7 +14953,7 @@
       </p:sp>
       <p:pic>
         <p:nvPicPr>
-          <p:cNvPr id="1486932145" name="Picture 679748627"/>
+          <p:cNvPr id="881847461" name="Picture 679748627"/>
           <p:cNvPicPr>
             <a:picLocks noChangeAspect="1"/>
           </p:cNvPicPr>
@@ -14976,7 +14976,7 @@
       </p:pic>
       <p:pic>
         <p:nvPicPr>
-          <p:cNvPr id="1731855985" name=""/>
+          <p:cNvPr id="1175280982" name=""/>
           <p:cNvPicPr>
             <a:picLocks noChangeAspect="1"/>
           </p:cNvPicPr>
@@ -14998,7 +14998,7 @@
       </p:pic>
       <p:pic>
         <p:nvPicPr>
-          <p:cNvPr id="829766484" name=""/>
+          <p:cNvPr id="1818543198" name=""/>
           <p:cNvPicPr>
             <a:picLocks noChangeAspect="1"/>
           </p:cNvPicPr>
@@ -15021,7 +15021,7 @@
       </p:pic>
       <p:pic>
         <p:nvPicPr>
-          <p:cNvPr id="774033780" name=""/>
+          <p:cNvPr id="438230704" name=""/>
           <p:cNvPicPr>
             <a:picLocks noChangeAspect="1"/>
           </p:cNvPicPr>
@@ -15043,7 +15043,7 @@
       </p:pic>
       <p:pic>
         <p:nvPicPr>
-          <p:cNvPr id="8915382" name=""/>
+          <p:cNvPr id="1247993413" name=""/>
           <p:cNvPicPr>
             <a:picLocks noChangeAspect="1"/>
           </p:cNvPicPr>
@@ -15065,7 +15065,7 @@
       </p:pic>
       <p:pic>
         <p:nvPicPr>
-          <p:cNvPr id="491481708" name=""/>
+          <p:cNvPr id="894257833" name=""/>
           <p:cNvPicPr>
             <a:picLocks noChangeAspect="1"/>
           </p:cNvPicPr>
@@ -15087,7 +15087,7 @@
       </p:pic>
       <p:cxnSp>
         <p:nvCxnSpPr>
-          <p:cNvPr id="1053960518" name=""/>
+          <p:cNvPr id="181706208" name=""/>
           <p:cNvCxnSpPr/>
           <p:nvPr/>
         </p:nvCxnSpPr>
@@ -15126,7 +15126,7 @@
       </p:cxnSp>
       <p:pic>
         <p:nvPicPr>
-          <p:cNvPr id="2142847226" name=""/>
+          <p:cNvPr id="1152271992" name=""/>
           <p:cNvPicPr>
             <a:picLocks noChangeAspect="1"/>
           </p:cNvPicPr>
@@ -15185,7 +15185,7 @@
       </p:grpSpPr>
       <p:pic>
         <p:nvPicPr>
-          <p:cNvPr id="1172166984" name=""/>
+          <p:cNvPr id="1850671735" name=""/>
           <p:cNvPicPr>
             <a:picLocks noChangeAspect="1"/>
           </p:cNvPicPr>
@@ -15207,7 +15207,7 @@
       </p:pic>
       <p:sp>
         <p:nvSpPr>
-          <p:cNvPr id="1853958212" name="Text Placeholder 1"/>
+          <p:cNvPr id="1281655831" name="Text Placeholder 1"/>
           <p:cNvSpPr>
             <a:spLocks noGrp="1"/>
           </p:cNvSpPr>
@@ -15238,7 +15238,7 @@
       </p:sp>
       <p:sp>
         <p:nvSpPr>
-          <p:cNvPr id="1250176608" name=""/>
+          <p:cNvPr id="1622081030" name=""/>
           <p:cNvSpPr txBox="1"/>
           <p:nvPr/>
         </p:nvSpPr>
@@ -15266,7 +15266,7 @@
       </p:sp>
       <p:pic>
         <p:nvPicPr>
-          <p:cNvPr id="309446073" name=""/>
+          <p:cNvPr id="650087887" name=""/>
           <p:cNvPicPr>
             <a:picLocks noChangeAspect="1"/>
           </p:cNvPicPr>
@@ -15288,7 +15288,7 @@
       </p:pic>
       <p:pic>
         <p:nvPicPr>
-          <p:cNvPr id="728031171" name=""/>
+          <p:cNvPr id="956957947" name=""/>
           <p:cNvPicPr>
             <a:picLocks noChangeAspect="1"/>
           </p:cNvPicPr>
@@ -15310,7 +15310,7 @@
       </p:pic>
       <p:pic>
         <p:nvPicPr>
-          <p:cNvPr id="779664142" name=""/>
+          <p:cNvPr id="1592140892" name=""/>
           <p:cNvPicPr>
             <a:picLocks noChangeAspect="1"/>
           </p:cNvPicPr>
@@ -15332,7 +15332,7 @@
       </p:pic>
       <p:pic>
         <p:nvPicPr>
-          <p:cNvPr id="1095852879" name=""/>
+          <p:cNvPr id="2028405980" name=""/>
           <p:cNvPicPr>
             <a:picLocks noChangeAspect="1"/>
           </p:cNvPicPr>
@@ -15354,7 +15354,7 @@
       </p:pic>
       <p:pic>
         <p:nvPicPr>
-          <p:cNvPr id="1366323830" name=""/>
+          <p:cNvPr id="1575007853" name=""/>
           <p:cNvPicPr>
             <a:picLocks noChangeAspect="1"/>
           </p:cNvPicPr>
@@ -15376,7 +15376,7 @@
       </p:pic>
       <p:pic>
         <p:nvPicPr>
-          <p:cNvPr id="867113347" name=""/>
+          <p:cNvPr id="1165060589" name=""/>
           <p:cNvPicPr>
             <a:picLocks noChangeAspect="1"/>
           </p:cNvPicPr>
@@ -15398,7 +15398,7 @@
       </p:pic>
       <p:pic>
         <p:nvPicPr>
-          <p:cNvPr id="2052415003" name=""/>
+          <p:cNvPr id="598688451" name=""/>
           <p:cNvPicPr>
             <a:picLocks noChangeAspect="1"/>
           </p:cNvPicPr>
@@ -15420,7 +15420,7 @@
       </p:pic>
       <p:pic>
         <p:nvPicPr>
-          <p:cNvPr id="1218497935" name=""/>
+          <p:cNvPr id="1606671395" name=""/>
           <p:cNvPicPr>
             <a:picLocks noChangeAspect="1"/>
           </p:cNvPicPr>
@@ -15442,7 +15442,7 @@
       </p:pic>
       <p:pic>
         <p:nvPicPr>
-          <p:cNvPr id="1945540232" name=""/>
+          <p:cNvPr id="1612849071" name=""/>
           <p:cNvPicPr>
             <a:picLocks noChangeAspect="1"/>
           </p:cNvPicPr>
@@ -15464,7 +15464,7 @@
       </p:pic>
       <p:pic>
         <p:nvPicPr>
-          <p:cNvPr id="462677185" name=""/>
+          <p:cNvPr id="1838993755" name=""/>
           <p:cNvPicPr>
             <a:picLocks noChangeAspect="1"/>
           </p:cNvPicPr>
@@ -15523,7 +15523,7 @@
       </p:grpSpPr>
       <p:pic>
         <p:nvPicPr>
-          <p:cNvPr id="457467881" name=""/>
+          <p:cNvPr id="883042818" name=""/>
           <p:cNvPicPr>
             <a:picLocks noChangeAspect="1"/>
           </p:cNvPicPr>
@@ -15545,7 +15545,7 @@
       </p:pic>
       <p:pic>
         <p:nvPicPr>
-          <p:cNvPr id="984312051" name=""/>
+          <p:cNvPr id="982920757" name=""/>
           <p:cNvPicPr>
             <a:picLocks noChangeAspect="1"/>
           </p:cNvPicPr>
@@ -15567,7 +15567,7 @@
       </p:pic>
       <p:sp>
         <p:nvSpPr>
-          <p:cNvPr id="982690852" name="Text Placeholder 1"/>
+          <p:cNvPr id="1360009101" name="Text Placeholder 1"/>
           <p:cNvSpPr>
             <a:spLocks noGrp="1"/>
           </p:cNvSpPr>
@@ -15598,7 +15598,7 @@
       </p:sp>
       <p:pic>
         <p:nvPicPr>
-          <p:cNvPr id="1242841778" name="Picture 679748627"/>
+          <p:cNvPr id="1361408877" name="Picture 679748627"/>
           <p:cNvPicPr>
             <a:picLocks noChangeAspect="1"/>
           </p:cNvPicPr>
@@ -15621,7 +15621,7 @@
       </p:pic>
       <p:pic>
         <p:nvPicPr>
-          <p:cNvPr id="1110066552" name=""/>
+          <p:cNvPr id="1450298840" name=""/>
           <p:cNvPicPr>
             <a:picLocks noChangeAspect="1"/>
           </p:cNvPicPr>
@@ -15643,7 +15643,7 @@
       </p:pic>
       <p:pic>
         <p:nvPicPr>
-          <p:cNvPr id="368640932" name=""/>
+          <p:cNvPr id="1491832345" name=""/>
           <p:cNvPicPr>
             <a:picLocks noChangeAspect="1"/>
           </p:cNvPicPr>
@@ -15666,7 +15666,7 @@
       </p:pic>
       <p:pic>
         <p:nvPicPr>
-          <p:cNvPr id="1409629139" name=""/>
+          <p:cNvPr id="1562948637" name=""/>
           <p:cNvPicPr>
             <a:picLocks noChangeAspect="1"/>
           </p:cNvPicPr>
@@ -15688,7 +15688,7 @@
       </p:pic>
       <p:pic>
         <p:nvPicPr>
-          <p:cNvPr id="1780099824" name=""/>
+          <p:cNvPr id="1547174947" name=""/>
           <p:cNvPicPr>
             <a:picLocks noChangeAspect="1"/>
           </p:cNvPicPr>
@@ -15747,7 +15747,7 @@
       </p:grpSpPr>
       <p:pic>
         <p:nvPicPr>
-          <p:cNvPr id="1011927113" name=""/>
+          <p:cNvPr id="1993011591" name=""/>
           <p:cNvPicPr>
             <a:picLocks noChangeAspect="1"/>
           </p:cNvPicPr>
@@ -15770,7 +15770,7 @@
       </p:pic>
       <p:pic>
         <p:nvPicPr>
-          <p:cNvPr id="1183780700" name=""/>
+          <p:cNvPr id="153512575" name=""/>
           <p:cNvPicPr>
             <a:picLocks noChangeAspect="1"/>
           </p:cNvPicPr>
@@ -15792,7 +15792,7 @@
       </p:pic>
       <p:sp>
         <p:nvSpPr>
-          <p:cNvPr id="1840193793" name="Text Placeholder 1"/>
+          <p:cNvPr id="2136087644" name="Text Placeholder 1"/>
           <p:cNvSpPr>
             <a:spLocks noGrp="1"/>
           </p:cNvSpPr>
@@ -15823,7 +15823,7 @@
       </p:sp>
       <p:pic>
         <p:nvPicPr>
-          <p:cNvPr id="829583046" name="Picture 679748627"/>
+          <p:cNvPr id="1520126145" name="Picture 679748627"/>
           <p:cNvPicPr>
             <a:picLocks noChangeAspect="1"/>
           </p:cNvPicPr>
@@ -15846,7 +15846,7 @@
       </p:pic>
       <p:pic>
         <p:nvPicPr>
-          <p:cNvPr id="542136036" name=""/>
+          <p:cNvPr id="1158513299" name=""/>
           <p:cNvPicPr>
             <a:picLocks noChangeAspect="1"/>
           </p:cNvPicPr>
@@ -15868,7 +15868,7 @@
       </p:pic>
       <p:pic>
         <p:nvPicPr>
-          <p:cNvPr id="404279304" name=""/>
+          <p:cNvPr id="1444630396" name=""/>
           <p:cNvPicPr>
             <a:picLocks noChangeAspect="1"/>
           </p:cNvPicPr>
@@ -15928,7 +15928,7 @@
       </p:grpSpPr>
       <p:pic>
         <p:nvPicPr>
-          <p:cNvPr id="162643710" name=""/>
+          <p:cNvPr id="1469939096" name=""/>
           <p:cNvPicPr>
             <a:picLocks noChangeAspect="1"/>
           </p:cNvPicPr>
@@ -15951,7 +15951,7 @@
       </p:pic>
       <p:pic>
         <p:nvPicPr>
-          <p:cNvPr id="1305405481" name=""/>
+          <p:cNvPr id="1713202902" name=""/>
           <p:cNvPicPr>
             <a:picLocks noChangeAspect="1"/>
           </p:cNvPicPr>
@@ -15974,7 +15974,7 @@
       </p:pic>
       <p:pic>
         <p:nvPicPr>
-          <p:cNvPr id="1560532236" name=""/>
+          <p:cNvPr id="2127136157" name=""/>
           <p:cNvPicPr>
             <a:picLocks noChangeAspect="1"/>
           </p:cNvPicPr>
@@ -15996,7 +15996,7 @@
       </p:pic>
       <p:sp>
         <p:nvSpPr>
-          <p:cNvPr id="1129439505" name="Text Placeholder 1"/>
+          <p:cNvPr id="832254810" name="Text Placeholder 1"/>
           <p:cNvSpPr>
             <a:spLocks noGrp="1"/>
           </p:cNvSpPr>
@@ -16027,7 +16027,7 @@
       </p:sp>
       <p:pic>
         <p:nvPicPr>
-          <p:cNvPr id="1266053562" name="Picture 679748627"/>
+          <p:cNvPr id="389774621" name="Picture 679748627"/>
           <p:cNvPicPr>
             <a:picLocks noChangeAspect="1"/>
           </p:cNvPicPr>
@@ -16050,7 +16050,7 @@
       </p:pic>
       <p:pic>
         <p:nvPicPr>
-          <p:cNvPr id="1881844356" name=""/>
+          <p:cNvPr id="1004783970" name=""/>
           <p:cNvPicPr>
             <a:picLocks noChangeAspect="1"/>
           </p:cNvPicPr>
@@ -16110,7 +16110,7 @@
       </p:grpSpPr>
       <p:pic>
         <p:nvPicPr>
-          <p:cNvPr id="404217703" name=""/>
+          <p:cNvPr id="1757824321" name=""/>
           <p:cNvPicPr>
             <a:picLocks noChangeAspect="1"/>
           </p:cNvPicPr>
@@ -16133,7 +16133,7 @@
       </p:pic>
       <p:pic>
         <p:nvPicPr>
-          <p:cNvPr id="267295746" name=""/>
+          <p:cNvPr id="109680442" name=""/>
           <p:cNvPicPr>
             <a:picLocks noChangeAspect="1"/>
           </p:cNvPicPr>
@@ -16156,7 +16156,7 @@
       </p:pic>
       <p:pic>
         <p:nvPicPr>
-          <p:cNvPr id="1777435823" name=""/>
+          <p:cNvPr id="1357681730" name=""/>
           <p:cNvPicPr>
             <a:picLocks noChangeAspect="1"/>
           </p:cNvPicPr>
@@ -16178,7 +16178,7 @@
       </p:pic>
       <p:sp>
         <p:nvSpPr>
-          <p:cNvPr id="1335781030" name="Text Placeholder 1"/>
+          <p:cNvPr id="1076267741" name="Text Placeholder 1"/>
           <p:cNvSpPr>
             <a:spLocks noGrp="1"/>
           </p:cNvSpPr>
@@ -16209,7 +16209,7 @@
       </p:sp>
       <p:pic>
         <p:nvPicPr>
-          <p:cNvPr id="182215724" name="Picture 679748627"/>
+          <p:cNvPr id="1607917050" name="Picture 679748627"/>
           <p:cNvPicPr>
             <a:picLocks noChangeAspect="1"/>
           </p:cNvPicPr>
@@ -16232,7 +16232,7 @@
       </p:pic>
       <p:pic>
         <p:nvPicPr>
-          <p:cNvPr id="1567599462" name=""/>
+          <p:cNvPr id="780953963" name=""/>
           <p:cNvPicPr>
             <a:picLocks noChangeAspect="1"/>
           </p:cNvPicPr>
@@ -16255,7 +16255,7 @@
       </p:pic>
       <p:sp>
         <p:nvSpPr>
-          <p:cNvPr id="118573545" name=""/>
+          <p:cNvPr id="983049609" name=""/>
           <p:cNvSpPr/>
           <p:nvPr/>
         </p:nvSpPr>
@@ -16296,7 +16296,7 @@
       </p:sp>
       <p:sp>
         <p:nvSpPr>
-          <p:cNvPr id="253312628" name=""/>
+          <p:cNvPr id="1883609468" name=""/>
           <p:cNvSpPr/>
           <p:nvPr/>
         </p:nvSpPr>
@@ -16337,7 +16337,7 @@
       </p:sp>
       <p:sp>
         <p:nvSpPr>
-          <p:cNvPr id="442887073" name=""/>
+          <p:cNvPr id="314189423" name=""/>
           <p:cNvSpPr/>
           <p:nvPr/>
         </p:nvSpPr>
@@ -16415,7 +16415,7 @@
       </p:grpSpPr>
       <p:pic>
         <p:nvPicPr>
-          <p:cNvPr id="1651114131" name=""/>
+          <p:cNvPr id="1413269967" name=""/>
           <p:cNvPicPr>
             <a:picLocks noChangeAspect="1"/>
           </p:cNvPicPr>
@@ -16438,7 +16438,7 @@
       </p:pic>
       <p:pic>
         <p:nvPicPr>
-          <p:cNvPr id="1100334734" name=""/>
+          <p:cNvPr id="924774548" name=""/>
           <p:cNvPicPr>
             <a:picLocks noChangeAspect="1"/>
           </p:cNvPicPr>
@@ -16461,7 +16461,7 @@
       </p:pic>
       <p:pic>
         <p:nvPicPr>
-          <p:cNvPr id="596110373" name=""/>
+          <p:cNvPr id="963338630" name=""/>
           <p:cNvPicPr>
             <a:picLocks noChangeAspect="1"/>
           </p:cNvPicPr>
@@ -16483,7 +16483,7 @@
       </p:pic>
       <p:sp>
         <p:nvSpPr>
-          <p:cNvPr id="1323995193" name="Text Placeholder 1"/>
+          <p:cNvPr id="1277649916" name="Text Placeholder 1"/>
           <p:cNvSpPr>
             <a:spLocks noGrp="1"/>
           </p:cNvSpPr>
@@ -16514,7 +16514,7 @@
       </p:sp>
       <p:pic>
         <p:nvPicPr>
-          <p:cNvPr id="324093284" name="Picture 679748627"/>
+          <p:cNvPr id="1730987358" name="Picture 679748627"/>
           <p:cNvPicPr>
             <a:picLocks noChangeAspect="1"/>
           </p:cNvPicPr>
@@ -16537,7 +16537,7 @@
       </p:pic>
       <p:pic>
         <p:nvPicPr>
-          <p:cNvPr id="556198453" name=""/>
+          <p:cNvPr id="572818521" name=""/>
           <p:cNvPicPr>
             <a:picLocks noChangeAspect="1"/>
           </p:cNvPicPr>
@@ -16560,7 +16560,7 @@
       </p:pic>
       <p:sp>
         <p:nvSpPr>
-          <p:cNvPr id="1265692865" name=""/>
+          <p:cNvPr id="1861567825" name=""/>
           <p:cNvSpPr/>
           <p:nvPr/>
         </p:nvSpPr>
@@ -16638,7 +16638,7 @@
       </p:grpSpPr>
       <p:pic>
         <p:nvPicPr>
-          <p:cNvPr id="211688492" name=""/>
+          <p:cNvPr id="1132832332" name=""/>
           <p:cNvPicPr>
             <a:picLocks noChangeAspect="1"/>
           </p:cNvPicPr>
@@ -16661,7 +16661,7 @@
       </p:pic>
       <p:pic>
         <p:nvPicPr>
-          <p:cNvPr id="1941593139" name=""/>
+          <p:cNvPr id="1273687502" name=""/>
           <p:cNvPicPr>
             <a:picLocks noChangeAspect="1"/>
           </p:cNvPicPr>
@@ -16684,7 +16684,7 @@
       </p:pic>
       <p:pic>
         <p:nvPicPr>
-          <p:cNvPr id="790759441" name=""/>
+          <p:cNvPr id="1515372068" name=""/>
           <p:cNvPicPr>
             <a:picLocks noChangeAspect="1"/>
           </p:cNvPicPr>
@@ -16706,7 +16706,7 @@
       </p:pic>
       <p:sp>
         <p:nvSpPr>
-          <p:cNvPr id="1434972053" name="Text Placeholder 1"/>
+          <p:cNvPr id="1330621463" name="Text Placeholder 1"/>
           <p:cNvSpPr>
             <a:spLocks noGrp="1"/>
           </p:cNvSpPr>
@@ -16737,7 +16737,7 @@
       </p:sp>
       <p:pic>
         <p:nvPicPr>
-          <p:cNvPr id="1013708116" name="Picture 679748627"/>
+          <p:cNvPr id="447260919" name="Picture 679748627"/>
           <p:cNvPicPr>
             <a:picLocks noChangeAspect="1"/>
           </p:cNvPicPr>
@@ -16760,7 +16760,7 @@
       </p:pic>
       <p:pic>
         <p:nvPicPr>
-          <p:cNvPr id="1986584179" name=""/>
+          <p:cNvPr id="2023114674" name=""/>
           <p:cNvPicPr>
             <a:picLocks noChangeAspect="1"/>
           </p:cNvPicPr>
@@ -16783,7 +16783,7 @@
       </p:pic>
       <p:sp>
         <p:nvSpPr>
-          <p:cNvPr id="1078157372" name=""/>
+          <p:cNvPr id="489858075" name=""/>
           <p:cNvSpPr/>
           <p:nvPr/>
         </p:nvSpPr>
@@ -16861,7 +16861,7 @@
       </p:grpSpPr>
       <p:pic>
         <p:nvPicPr>
-          <p:cNvPr id="869141968" name=""/>
+          <p:cNvPr id="735253144" name=""/>
           <p:cNvPicPr>
             <a:picLocks noChangeAspect="1"/>
           </p:cNvPicPr>
@@ -16883,7 +16883,7 @@
       </p:pic>
       <p:sp>
         <p:nvSpPr>
-          <p:cNvPr id="105141117" name="Text Placeholder 1"/>
+          <p:cNvPr id="183230776" name="Text Placeholder 1"/>
           <p:cNvSpPr>
             <a:spLocks noGrp="1"/>
           </p:cNvSpPr>
@@ -16914,7 +16914,7 @@
       </p:sp>
       <p:pic>
         <p:nvPicPr>
-          <p:cNvPr id="981306498" name="Picture 679748627"/>
+          <p:cNvPr id="1199076199" name="Picture 679748627"/>
           <p:cNvPicPr>
             <a:picLocks noChangeAspect="1"/>
           </p:cNvPicPr>
@@ -16937,7 +16937,7 @@
       </p:pic>
       <p:pic>
         <p:nvPicPr>
-          <p:cNvPr id="583572092" name=""/>
+          <p:cNvPr id="2061369134" name=""/>
           <p:cNvPicPr>
             <a:picLocks noChangeAspect="1"/>
           </p:cNvPicPr>
@@ -16960,7 +16960,7 @@
       </p:pic>
       <p:pic>
         <p:nvPicPr>
-          <p:cNvPr id="919099494" name=""/>
+          <p:cNvPr id="1135984103" name=""/>
           <p:cNvPicPr>
             <a:picLocks noChangeAspect="1"/>
           </p:cNvPicPr>
@@ -16982,7 +16982,7 @@
       </p:pic>
       <p:pic>
         <p:nvPicPr>
-          <p:cNvPr id="515682798" name=""/>
+          <p:cNvPr id="1419323548" name=""/>
           <p:cNvPicPr>
             <a:picLocks noChangeAspect="1"/>
           </p:cNvPicPr>
@@ -17005,7 +17005,7 @@
       </p:pic>
       <p:sp>
         <p:nvSpPr>
-          <p:cNvPr id="114428562" name=""/>
+          <p:cNvPr id="158169899" name=""/>
           <p:cNvSpPr/>
           <p:nvPr/>
         </p:nvSpPr>
@@ -17083,7 +17083,7 @@
       </p:grpSpPr>
       <p:pic>
         <p:nvPicPr>
-          <p:cNvPr id="131826280" name=""/>
+          <p:cNvPr id="217670176" name=""/>
           <p:cNvPicPr>
             <a:picLocks noChangeAspect="1"/>
           </p:cNvPicPr>
@@ -17105,7 +17105,7 @@
       </p:pic>
       <p:sp>
         <p:nvSpPr>
-          <p:cNvPr id="1340146963" name="Text Placeholder 1"/>
+          <p:cNvPr id="1939884961" name="Text Placeholder 1"/>
           <p:cNvSpPr>
             <a:spLocks noGrp="1"/>
           </p:cNvSpPr>
@@ -17136,7 +17136,7 @@
       </p:sp>
       <p:pic>
         <p:nvPicPr>
-          <p:cNvPr id="1432563668" name="Picture 679748627"/>
+          <p:cNvPr id="485077614" name="Picture 679748627"/>
           <p:cNvPicPr>
             <a:picLocks noChangeAspect="1"/>
           </p:cNvPicPr>
@@ -17159,7 +17159,7 @@
       </p:pic>
       <p:pic>
         <p:nvPicPr>
-          <p:cNvPr id="1443514406" name=""/>
+          <p:cNvPr id="775233243" name=""/>
           <p:cNvPicPr>
             <a:picLocks noChangeAspect="1"/>
           </p:cNvPicPr>
@@ -17182,7 +17182,7 @@
       </p:pic>
       <p:pic>
         <p:nvPicPr>
-          <p:cNvPr id="31031002" name=""/>
+          <p:cNvPr id="853600058" name=""/>
           <p:cNvPicPr>
             <a:picLocks noChangeAspect="1"/>
           </p:cNvPicPr>
@@ -17204,7 +17204,7 @@
       </p:pic>
       <p:pic>
         <p:nvPicPr>
-          <p:cNvPr id="1545906853" name=""/>
+          <p:cNvPr id="80728338" name=""/>
           <p:cNvPicPr>
             <a:picLocks noChangeAspect="1"/>
           </p:cNvPicPr>
@@ -17227,7 +17227,7 @@
       </p:pic>
       <p:pic>
         <p:nvPicPr>
-          <p:cNvPr id="1398304058" name=""/>
+          <p:cNvPr id="1963628352" name=""/>
           <p:cNvPicPr>
             <a:picLocks noChangeAspect="1"/>
           </p:cNvPicPr>
@@ -17286,7 +17286,7 @@
       </p:grpSpPr>
       <p:sp>
         <p:nvSpPr>
-          <p:cNvPr id="596441793" name="Content Placeholder 3"/>
+          <p:cNvPr id="437491997" name="Content Placeholder 3"/>
           <p:cNvSpPr>
             <a:spLocks noGrp="1"/>
           </p:cNvSpPr>
@@ -17328,7 +17328,7 @@
             </a:pPr>
             <a:r>
               <a:rPr/>
-              <a:t>Compatibilita</a:t>
+              <a:t>Compatibilità</a:t>
             </a:r>
             <a:endParaRPr/>
           </a:p>
@@ -17376,7 +17376,7 @@
                 <a:ea typeface="Arial"/>
                 <a:cs typeface="Arial"/>
               </a:rPr>
-              <a:t>Sviluppo di un sistema di logging su scheda SD per analisi approfondite.</a:t>
+              <a:t>Sviluppo di un sistema di data logging su scheda SD per analisi approfondite.</a:t>
             </a:r>
             <a:endParaRPr/>
           </a:p>
@@ -17448,7 +17448,7 @@
       </p:sp>
       <p:sp>
         <p:nvSpPr>
-          <p:cNvPr id="740035372" name="Content Placeholder 3"/>
+          <p:cNvPr id="1175014795" name="Content Placeholder 3"/>
           <p:cNvSpPr>
             <a:spLocks noGrp="1"/>
           </p:cNvSpPr>
@@ -17613,7 +17613,7 @@
                 <a:ea typeface="ＭＳ Ｐゴシック"/>
                 <a:cs typeface="ＭＳ Ｐゴシック"/>
               </a:rPr>
-              <a:t>Affidabilita’</a:t>
+              <a:t>Affidabilità</a:t>
             </a:r>
             <a:endParaRPr lang="it-IT" sz="2000" b="0" i="0" u="none" strike="noStrike" cap="none" spc="0">
               <a:solidFill>
@@ -17659,7 +17659,7 @@
                 <a:ea typeface="ＭＳ Ｐゴシック"/>
                 <a:cs typeface="ＭＳ Ｐゴシック"/>
               </a:rPr>
-              <a:t>Compatibilita’</a:t>
+              <a:t>Compatibilità</a:t>
             </a:r>
             <a:endParaRPr lang="it-IT" sz="2000" b="0" i="0" u="none" strike="noStrike" cap="none" spc="0">
               <a:solidFill>
@@ -17742,7 +17742,7 @@
       </p:sp>
       <p:sp>
         <p:nvSpPr>
-          <p:cNvPr id="928722929" name=""/>
+          <p:cNvPr id="212064529" name=""/>
           <p:cNvSpPr txBox="1"/>
           <p:nvPr/>
         </p:nvSpPr>
@@ -17783,7 +17783,7 @@
       </p:sp>
       <p:sp>
         <p:nvSpPr>
-          <p:cNvPr id="1920432481" name=""/>
+          <p:cNvPr id="1943806957" name=""/>
           <p:cNvSpPr txBox="1"/>
           <p:nvPr/>
         </p:nvSpPr>
@@ -17861,7 +17861,7 @@
       </p:grpSpPr>
       <p:sp>
         <p:nvSpPr>
-          <p:cNvPr id="1726115521" name="Text Placeholder 1"/>
+          <p:cNvPr id="1752266129" name="Text Placeholder 1"/>
           <p:cNvSpPr>
             <a:spLocks noGrp="1"/>
           </p:cNvSpPr>
@@ -17887,7 +17887,7 @@
       </p:sp>
       <p:sp>
         <p:nvSpPr>
-          <p:cNvPr id="530258988" name="Content Placeholder 2"/>
+          <p:cNvPr id="1780294865" name="Content Placeholder 2"/>
           <p:cNvSpPr>
             <a:spLocks noGrp="1"/>
           </p:cNvSpPr>
@@ -17920,7 +17920,7 @@
       </p:sp>
       <p:pic>
         <p:nvPicPr>
-          <p:cNvPr id="1155087400" name=""/>
+          <p:cNvPr id="1459734627" name=""/>
           <p:cNvPicPr>
             <a:picLocks noChangeAspect="1"/>
           </p:cNvPicPr>
@@ -17942,7 +17942,7 @@
       </p:pic>
       <p:sp>
         <p:nvSpPr>
-          <p:cNvPr id="1599628243" name=""/>
+          <p:cNvPr id="270847881" name=""/>
           <p:cNvSpPr txBox="1"/>
           <p:nvPr/>
         </p:nvSpPr>
@@ -17974,7 +17974,7 @@
       </p:sp>
       <p:pic>
         <p:nvPicPr>
-          <p:cNvPr id="2037993465" name=""/>
+          <p:cNvPr id="422074556" name=""/>
           <p:cNvPicPr>
             <a:picLocks noChangeAspect="1"/>
           </p:cNvPicPr>
@@ -17996,7 +17996,7 @@
       </p:pic>
       <p:pic>
         <p:nvPicPr>
-          <p:cNvPr id="578839665" name=""/>
+          <p:cNvPr id="530170949" name=""/>
           <p:cNvPicPr>
             <a:picLocks noChangeAspect="1"/>
           </p:cNvPicPr>
@@ -18018,7 +18018,7 @@
       </p:pic>
       <p:sp>
         <p:nvSpPr>
-          <p:cNvPr id="1178858310" name=""/>
+          <p:cNvPr id="639509160" name=""/>
           <p:cNvSpPr txBox="1"/>
           <p:nvPr/>
         </p:nvSpPr>
@@ -18090,7 +18090,7 @@
       </p:grpSpPr>
       <p:pic>
         <p:nvPicPr>
-          <p:cNvPr id="514849976" name=""/>
+          <p:cNvPr id="1006877703" name=""/>
           <p:cNvPicPr>
             <a:picLocks noChangeAspect="1"/>
           </p:cNvPicPr>
@@ -18112,7 +18112,7 @@
       </p:pic>
       <p:sp>
         <p:nvSpPr>
-          <p:cNvPr id="106103530" name=""/>
+          <p:cNvPr id="792091491" name=""/>
           <p:cNvSpPr txBox="1"/>
           <p:nvPr/>
         </p:nvSpPr>
@@ -18140,7 +18140,7 @@
       </p:sp>
       <p:pic>
         <p:nvPicPr>
-          <p:cNvPr id="1074704805" name=""/>
+          <p:cNvPr id="1296025388" name=""/>
           <p:cNvPicPr>
             <a:picLocks noChangeAspect="1"/>
           </p:cNvPicPr>
@@ -18162,7 +18162,7 @@
       </p:pic>
       <p:pic>
         <p:nvPicPr>
-          <p:cNvPr id="163967708" name=""/>
+          <p:cNvPr id="262151089" name=""/>
           <p:cNvPicPr>
             <a:picLocks noChangeAspect="1"/>
           </p:cNvPicPr>
@@ -18184,7 +18184,7 @@
       </p:pic>
       <p:pic>
         <p:nvPicPr>
-          <p:cNvPr id="365413020" name=""/>
+          <p:cNvPr id="1526007444" name=""/>
           <p:cNvPicPr>
             <a:picLocks noChangeAspect="1"/>
           </p:cNvPicPr>
@@ -18206,7 +18206,7 @@
       </p:pic>
       <p:pic>
         <p:nvPicPr>
-          <p:cNvPr id="363989404" name=""/>
+          <p:cNvPr id="979550762" name=""/>
           <p:cNvPicPr>
             <a:picLocks noChangeAspect="1"/>
           </p:cNvPicPr>
@@ -18228,7 +18228,7 @@
       </p:pic>
       <p:pic>
         <p:nvPicPr>
-          <p:cNvPr id="928834750" name=""/>
+          <p:cNvPr id="1596859246" name=""/>
           <p:cNvPicPr>
             <a:picLocks noChangeAspect="1"/>
           </p:cNvPicPr>
@@ -18250,7 +18250,7 @@
       </p:pic>
       <p:pic>
         <p:nvPicPr>
-          <p:cNvPr id="302237639" name=""/>
+          <p:cNvPr id="1256250729" name=""/>
           <p:cNvPicPr>
             <a:picLocks noChangeAspect="1"/>
           </p:cNvPicPr>
@@ -18272,7 +18272,7 @@
       </p:pic>
       <p:pic>
         <p:nvPicPr>
-          <p:cNvPr id="1818010507" name=""/>
+          <p:cNvPr id="1284272830" name=""/>
           <p:cNvPicPr>
             <a:picLocks noChangeAspect="1"/>
           </p:cNvPicPr>
@@ -18294,7 +18294,7 @@
       </p:pic>
       <p:pic>
         <p:nvPicPr>
-          <p:cNvPr id="789633354" name=""/>
+          <p:cNvPr id="1115578170" name=""/>
           <p:cNvPicPr>
             <a:picLocks noChangeAspect="1"/>
           </p:cNvPicPr>
@@ -18316,7 +18316,7 @@
       </p:pic>
       <p:pic>
         <p:nvPicPr>
-          <p:cNvPr id="2022205013" name=""/>
+          <p:cNvPr id="1365081177" name=""/>
           <p:cNvPicPr>
             <a:picLocks noChangeAspect="1"/>
           </p:cNvPicPr>
@@ -18338,7 +18338,7 @@
       </p:pic>
       <p:pic>
         <p:nvPicPr>
-          <p:cNvPr id="1213547321" name=""/>
+          <p:cNvPr id="1052814155" name=""/>
           <p:cNvPicPr>
             <a:picLocks noChangeAspect="1"/>
           </p:cNvPicPr>
@@ -18360,7 +18360,7 @@
       </p:pic>
       <p:sp>
         <p:nvSpPr>
-          <p:cNvPr id="317009293" name="Text Placeholder 1"/>
+          <p:cNvPr id="975538029" name="Text Placeholder 1"/>
           <p:cNvSpPr>
             <a:spLocks noGrp="1"/>
           </p:cNvSpPr>
@@ -18391,7 +18391,7 @@
       </p:sp>
       <p:pic>
         <p:nvPicPr>
-          <p:cNvPr id="1359361979" name="Picture 679748627"/>
+          <p:cNvPr id="1031526210" name="Picture 679748627"/>
           <p:cNvPicPr>
             <a:picLocks noChangeAspect="1"/>
           </p:cNvPicPr>
@@ -18450,7 +18450,7 @@
       </p:grpSpPr>
       <p:sp>
         <p:nvSpPr>
-          <p:cNvPr id="156379318" name="Text Placeholder 1"/>
+          <p:cNvPr id="1012100672" name="Text Placeholder 1"/>
           <p:cNvSpPr>
             <a:spLocks noGrp="1"/>
           </p:cNvSpPr>
@@ -18481,7 +18481,7 @@
       </p:sp>
       <p:pic>
         <p:nvPicPr>
-          <p:cNvPr id="657514150" name=""/>
+          <p:cNvPr id="1806233219" name=""/>
           <p:cNvPicPr>
             <a:picLocks noChangeAspect="1"/>
           </p:cNvPicPr>
@@ -18503,7 +18503,7 @@
       </p:pic>
       <p:pic>
         <p:nvPicPr>
-          <p:cNvPr id="967236844" name=""/>
+          <p:cNvPr id="1549065279" name=""/>
           <p:cNvPicPr>
             <a:picLocks noChangeAspect="1"/>
           </p:cNvPicPr>
@@ -18525,7 +18525,7 @@
       </p:pic>
       <p:pic>
         <p:nvPicPr>
-          <p:cNvPr id="241360347" name=""/>
+          <p:cNvPr id="1375263137" name=""/>
           <p:cNvPicPr>
             <a:picLocks noChangeAspect="1"/>
           </p:cNvPicPr>
@@ -18547,7 +18547,7 @@
       </p:pic>
       <p:pic>
         <p:nvPicPr>
-          <p:cNvPr id="348655943" name=""/>
+          <p:cNvPr id="1967865834" name=""/>
           <p:cNvPicPr>
             <a:picLocks noChangeAspect="1"/>
           </p:cNvPicPr>
@@ -18570,7 +18570,7 @@
       </p:pic>
       <p:pic>
         <p:nvPicPr>
-          <p:cNvPr id="509128563" name=""/>
+          <p:cNvPr id="457607646" name=""/>
           <p:cNvPicPr>
             <a:picLocks noChangeAspect="1"/>
           </p:cNvPicPr>
@@ -18625,7 +18625,7 @@
       </p:grpSpPr>
       <p:pic>
         <p:nvPicPr>
-          <p:cNvPr id="473873300" name=""/>
+          <p:cNvPr id="2070816204" name=""/>
           <p:cNvPicPr>
             <a:picLocks noChangeAspect="1"/>
           </p:cNvPicPr>
@@ -18647,7 +18647,7 @@
       </p:pic>
       <p:sp>
         <p:nvSpPr>
-          <p:cNvPr id="2054186930" name=""/>
+          <p:cNvPr id="1935894849" name=""/>
           <p:cNvSpPr txBox="1"/>
           <p:nvPr/>
         </p:nvSpPr>
@@ -18675,7 +18675,7 @@
       </p:sp>
       <p:pic>
         <p:nvPicPr>
-          <p:cNvPr id="175659247" name=""/>
+          <p:cNvPr id="728351176" name=""/>
           <p:cNvPicPr>
             <a:picLocks noChangeAspect="1"/>
           </p:cNvPicPr>
@@ -18697,7 +18697,7 @@
       </p:pic>
       <p:pic>
         <p:nvPicPr>
-          <p:cNvPr id="1981906285" name=""/>
+          <p:cNvPr id="1370986135" name=""/>
           <p:cNvPicPr>
             <a:picLocks noChangeAspect="1"/>
           </p:cNvPicPr>
@@ -18719,7 +18719,7 @@
       </p:pic>
       <p:pic>
         <p:nvPicPr>
-          <p:cNvPr id="2114005113" name=""/>
+          <p:cNvPr id="1333387813" name=""/>
           <p:cNvPicPr>
             <a:picLocks noChangeAspect="1"/>
           </p:cNvPicPr>
@@ -18741,7 +18741,7 @@
       </p:pic>
       <p:pic>
         <p:nvPicPr>
-          <p:cNvPr id="665936815" name=""/>
+          <p:cNvPr id="1882019370" name=""/>
           <p:cNvPicPr>
             <a:picLocks noChangeAspect="1"/>
           </p:cNvPicPr>
@@ -18763,7 +18763,7 @@
       </p:pic>
       <p:pic>
         <p:nvPicPr>
-          <p:cNvPr id="1179585448" name=""/>
+          <p:cNvPr id="433320527" name=""/>
           <p:cNvPicPr>
             <a:picLocks noChangeAspect="1"/>
           </p:cNvPicPr>
@@ -18785,7 +18785,7 @@
       </p:pic>
       <p:pic>
         <p:nvPicPr>
-          <p:cNvPr id="1113989461" name=""/>
+          <p:cNvPr id="1397745581" name=""/>
           <p:cNvPicPr>
             <a:picLocks noChangeAspect="1"/>
           </p:cNvPicPr>
@@ -18807,7 +18807,7 @@
       </p:pic>
       <p:pic>
         <p:nvPicPr>
-          <p:cNvPr id="1703083695" name=""/>
+          <p:cNvPr id="1362061021" name=""/>
           <p:cNvPicPr>
             <a:picLocks noChangeAspect="1"/>
           </p:cNvPicPr>
@@ -18829,7 +18829,7 @@
       </p:pic>
       <p:pic>
         <p:nvPicPr>
-          <p:cNvPr id="1866832943" name=""/>
+          <p:cNvPr id="2091894273" name=""/>
           <p:cNvPicPr>
             <a:picLocks noChangeAspect="1"/>
           </p:cNvPicPr>
@@ -18851,7 +18851,7 @@
       </p:pic>
       <p:pic>
         <p:nvPicPr>
-          <p:cNvPr id="1416527525" name=""/>
+          <p:cNvPr id="1482127096" name=""/>
           <p:cNvPicPr>
             <a:picLocks noChangeAspect="1"/>
           </p:cNvPicPr>
@@ -18873,7 +18873,7 @@
       </p:pic>
       <p:pic>
         <p:nvPicPr>
-          <p:cNvPr id="1637985329" name=""/>
+          <p:cNvPr id="1518560714" name=""/>
           <p:cNvPicPr>
             <a:picLocks noChangeAspect="1"/>
           </p:cNvPicPr>
@@ -18895,7 +18895,7 @@
       </p:pic>
       <p:sp>
         <p:nvSpPr>
-          <p:cNvPr id="985903103" name="Text Placeholder 1"/>
+          <p:cNvPr id="1941388760" name="Text Placeholder 1"/>
           <p:cNvSpPr>
             <a:spLocks noGrp="1"/>
           </p:cNvSpPr>
@@ -19332,7 +19332,7 @@
       </p:grpSpPr>
       <p:sp>
         <p:nvSpPr>
-          <p:cNvPr id="382041281" name=""/>
+          <p:cNvPr id="1350432720" name=""/>
           <p:cNvSpPr txBox="1"/>
           <p:nvPr/>
         </p:nvSpPr>
@@ -19360,7 +19360,7 @@
       </p:sp>
       <p:pic>
         <p:nvPicPr>
-          <p:cNvPr id="2080968390" name=""/>
+          <p:cNvPr id="754693984" name=""/>
           <p:cNvPicPr>
             <a:picLocks noChangeAspect="1"/>
           </p:cNvPicPr>
@@ -19382,7 +19382,7 @@
       </p:pic>
       <p:sp>
         <p:nvSpPr>
-          <p:cNvPr id="226686238" name="Text Placeholder 1"/>
+          <p:cNvPr id="29866484" name="Text Placeholder 1"/>
           <p:cNvSpPr>
             <a:spLocks noGrp="1"/>
           </p:cNvSpPr>
@@ -19422,7 +19422,7 @@
       </p:sp>
       <p:pic>
         <p:nvPicPr>
-          <p:cNvPr id="510773949" name="Picture 679748627"/>
+          <p:cNvPr id="1010324327" name="Picture 679748627"/>
           <p:cNvPicPr>
             <a:picLocks noChangeAspect="1"/>
           </p:cNvPicPr>
@@ -19444,7 +19444,7 @@
       </p:pic>
       <p:pic>
         <p:nvPicPr>
-          <p:cNvPr id="1340137629" name=""/>
+          <p:cNvPr id="1159159855" name=""/>
           <p:cNvPicPr>
             <a:picLocks noChangeAspect="1"/>
           </p:cNvPicPr>
@@ -19466,7 +19466,7 @@
       </p:pic>
       <p:sp>
         <p:nvSpPr>
-          <p:cNvPr id="1879475496" name=""/>
+          <p:cNvPr id="648440115" name=""/>
           <p:cNvSpPr txBox="1"/>
           <p:nvPr/>
         </p:nvSpPr>
@@ -19546,7 +19546,7 @@
       </p:grpSpPr>
       <p:sp>
         <p:nvSpPr>
-          <p:cNvPr id="2044491187" name=""/>
+          <p:cNvPr id="1257278243" name=""/>
           <p:cNvSpPr txBox="1"/>
           <p:nvPr/>
         </p:nvSpPr>
@@ -19574,7 +19574,7 @@
       </p:sp>
       <p:pic>
         <p:nvPicPr>
-          <p:cNvPr id="2039586152" name=""/>
+          <p:cNvPr id="507321153" name=""/>
           <p:cNvPicPr>
             <a:picLocks noChangeAspect="1"/>
           </p:cNvPicPr>
@@ -19596,7 +19596,7 @@
       </p:pic>
       <p:pic>
         <p:nvPicPr>
-          <p:cNvPr id="554006928" name="Picture 679748627"/>
+          <p:cNvPr id="326415773" name="Picture 679748627"/>
           <p:cNvPicPr>
             <a:picLocks noChangeAspect="1"/>
           </p:cNvPicPr>
@@ -19618,7 +19618,7 @@
       </p:pic>
       <p:pic>
         <p:nvPicPr>
-          <p:cNvPr id="439267405" name=""/>
+          <p:cNvPr id="326009324" name=""/>
           <p:cNvPicPr>
             <a:picLocks noChangeAspect="1"/>
           </p:cNvPicPr>
@@ -19640,7 +19640,7 @@
       </p:pic>
       <p:pic>
         <p:nvPicPr>
-          <p:cNvPr id="1920391419" name=""/>
+          <p:cNvPr id="201583240" name=""/>
           <p:cNvPicPr>
             <a:picLocks noChangeAspect="1"/>
           </p:cNvPicPr>
@@ -19662,7 +19662,7 @@
       </p:pic>
       <p:sp>
         <p:nvSpPr>
-          <p:cNvPr id="1065583601" name="Text Placeholder 1"/>
+          <p:cNvPr id="399202179" name="Text Placeholder 1"/>
           <p:cNvSpPr>
             <a:spLocks noGrp="1"/>
           </p:cNvSpPr>
@@ -19864,7 +19864,7 @@
       </p:sp>
       <p:sp>
         <p:nvSpPr>
-          <p:cNvPr id="1950747910" name=""/>
+          <p:cNvPr id="2050349390" name=""/>
           <p:cNvSpPr txBox="1"/>
           <p:nvPr/>
         </p:nvSpPr>
@@ -19905,7 +19905,7 @@
       </p:sp>
       <p:sp>
         <p:nvSpPr>
-          <p:cNvPr id="1256542808" name=""/>
+          <p:cNvPr id="1554031720" name=""/>
           <p:cNvSpPr txBox="1"/>
           <p:nvPr/>
         </p:nvSpPr>
@@ -19981,7 +19981,7 @@
       </p:grpSpPr>
       <p:sp>
         <p:nvSpPr>
-          <p:cNvPr id="25246131" name=""/>
+          <p:cNvPr id="570563085" name=""/>
           <p:cNvSpPr txBox="1"/>
           <p:nvPr/>
         </p:nvSpPr>
@@ -20009,7 +20009,7 @@
       </p:sp>
       <p:pic>
         <p:nvPicPr>
-          <p:cNvPr id="307260188" name=""/>
+          <p:cNvPr id="745081363" name=""/>
           <p:cNvPicPr>
             <a:picLocks noChangeAspect="1"/>
           </p:cNvPicPr>
@@ -20031,7 +20031,7 @@
       </p:pic>
       <p:pic>
         <p:nvPicPr>
-          <p:cNvPr id="1798357" name="Picture 679748627"/>
+          <p:cNvPr id="660060210" name="Picture 679748627"/>
           <p:cNvPicPr>
             <a:picLocks noChangeAspect="1"/>
           </p:cNvPicPr>
@@ -20053,7 +20053,7 @@
       </p:pic>
       <p:pic>
         <p:nvPicPr>
-          <p:cNvPr id="577073749" name=""/>
+          <p:cNvPr id="1956285099" name=""/>
           <p:cNvPicPr>
             <a:picLocks noChangeAspect="1"/>
           </p:cNvPicPr>
@@ -20075,7 +20075,7 @@
       </p:pic>
       <p:pic>
         <p:nvPicPr>
-          <p:cNvPr id="1770683132" name=""/>
+          <p:cNvPr id="1683657306" name=""/>
           <p:cNvPicPr>
             <a:picLocks noChangeAspect="1"/>
           </p:cNvPicPr>
@@ -20097,7 +20097,7 @@
       </p:pic>
       <p:pic>
         <p:nvPicPr>
-          <p:cNvPr id="224562362" name=""/>
+          <p:cNvPr id="2121345766" name=""/>
           <p:cNvPicPr>
             <a:picLocks noChangeAspect="1"/>
           </p:cNvPicPr>
@@ -20120,7 +20120,7 @@
       </p:pic>
       <p:sp>
         <p:nvSpPr>
-          <p:cNvPr id="1004294329" name="Text Placeholder 1"/>
+          <p:cNvPr id="1735673979" name="Text Placeholder 1"/>
           <p:cNvSpPr>
             <a:spLocks noGrp="1"/>
           </p:cNvSpPr>
@@ -20166,7 +20166,7 @@
       </p:sp>
       <p:sp>
         <p:nvSpPr>
-          <p:cNvPr id="1135712092" name=""/>
+          <p:cNvPr id="1057670178" name=""/>
           <p:cNvSpPr txBox="1"/>
           <p:nvPr/>
         </p:nvSpPr>
@@ -20205,7 +20205,7 @@
       </p:sp>
       <p:sp>
         <p:nvSpPr>
-          <p:cNvPr id="12239654" name=""/>
+          <p:cNvPr id="17562217" name=""/>
           <p:cNvSpPr txBox="1"/>
           <p:nvPr/>
         </p:nvSpPr>
@@ -20281,7 +20281,7 @@
       </p:grpSpPr>
       <p:sp>
         <p:nvSpPr>
-          <p:cNvPr id="127678543" name=""/>
+          <p:cNvPr id="570956629" name=""/>
           <p:cNvSpPr txBox="1"/>
           <p:nvPr/>
         </p:nvSpPr>
@@ -20309,7 +20309,7 @@
       </p:sp>
       <p:pic>
         <p:nvPicPr>
-          <p:cNvPr id="921358937" name=""/>
+          <p:cNvPr id="953402820" name=""/>
           <p:cNvPicPr>
             <a:picLocks noChangeAspect="1"/>
           </p:cNvPicPr>
@@ -20331,7 +20331,7 @@
       </p:pic>
       <p:pic>
         <p:nvPicPr>
-          <p:cNvPr id="820652820" name="Picture 679748627"/>
+          <p:cNvPr id="2029884321" name="Picture 679748627"/>
           <p:cNvPicPr>
             <a:picLocks noChangeAspect="1"/>
           </p:cNvPicPr>
@@ -20353,7 +20353,7 @@
       </p:pic>
       <p:pic>
         <p:nvPicPr>
-          <p:cNvPr id="1914330454" name=""/>
+          <p:cNvPr id="795864717" name=""/>
           <p:cNvPicPr>
             <a:picLocks noChangeAspect="1"/>
           </p:cNvPicPr>
@@ -20375,7 +20375,7 @@
       </p:pic>
       <p:pic>
         <p:nvPicPr>
-          <p:cNvPr id="2121145583" name=""/>
+          <p:cNvPr id="2019867787" name=""/>
           <p:cNvPicPr>
             <a:picLocks noChangeAspect="1"/>
           </p:cNvPicPr>
@@ -20397,7 +20397,7 @@
       </p:pic>
       <p:pic>
         <p:nvPicPr>
-          <p:cNvPr id="1839462010" name=""/>
+          <p:cNvPr id="1343336259" name=""/>
           <p:cNvPicPr>
             <a:picLocks noChangeAspect="1"/>
           </p:cNvPicPr>
@@ -20420,7 +20420,7 @@
       </p:pic>
       <p:pic>
         <p:nvPicPr>
-          <p:cNvPr id="1405881837" name=""/>
+          <p:cNvPr id="63091067" name=""/>
           <p:cNvPicPr>
             <a:picLocks noChangeAspect="1"/>
           </p:cNvPicPr>
@@ -20443,7 +20443,7 @@
       </p:pic>
       <p:sp>
         <p:nvSpPr>
-          <p:cNvPr id="643212394" name="Text Placeholder 1"/>
+          <p:cNvPr id="456438732" name="Text Placeholder 1"/>
           <p:cNvSpPr>
             <a:spLocks noGrp="1"/>
           </p:cNvSpPr>
@@ -20489,7 +20489,7 @@
       </p:sp>
       <p:sp>
         <p:nvSpPr>
-          <p:cNvPr id="1605523350" name=""/>
+          <p:cNvPr id="173563396" name=""/>
           <p:cNvSpPr txBox="1"/>
           <p:nvPr/>
         </p:nvSpPr>
@@ -20530,7 +20530,7 @@
       </p:sp>
       <p:sp>
         <p:nvSpPr>
-          <p:cNvPr id="1364179778" name=""/>
+          <p:cNvPr id="921649279" name=""/>
           <p:cNvSpPr txBox="1"/>
           <p:nvPr/>
         </p:nvSpPr>
@@ -20569,7 +20569,7 @@
       </p:sp>
       <p:sp>
         <p:nvSpPr>
-          <p:cNvPr id="613519001" name=""/>
+          <p:cNvPr id="564671963" name=""/>
           <p:cNvSpPr txBox="1"/>
           <p:nvPr/>
         </p:nvSpPr>
@@ -20646,7 +20646,7 @@
       </p:grpSpPr>
       <p:sp>
         <p:nvSpPr>
-          <p:cNvPr id="2060833819" name=""/>
+          <p:cNvPr id="960269268" name=""/>
           <p:cNvSpPr txBox="1"/>
           <p:nvPr/>
         </p:nvSpPr>
@@ -20674,7 +20674,7 @@
       </p:sp>
       <p:pic>
         <p:nvPicPr>
-          <p:cNvPr id="378732805" name=""/>
+          <p:cNvPr id="716116141" name=""/>
           <p:cNvPicPr>
             <a:picLocks noChangeAspect="1"/>
           </p:cNvPicPr>
@@ -20696,7 +20696,7 @@
       </p:pic>
       <p:sp>
         <p:nvSpPr>
-          <p:cNvPr id="752663428" name="Text Placeholder 1"/>
+          <p:cNvPr id="102389605" name="Text Placeholder 1"/>
           <p:cNvSpPr>
             <a:spLocks noGrp="1"/>
           </p:cNvSpPr>
@@ -20727,7 +20727,7 @@
       </p:sp>
       <p:pic>
         <p:nvPicPr>
-          <p:cNvPr id="499736362" name="Picture 679748627"/>
+          <p:cNvPr id="1300045740" name="Picture 679748627"/>
           <p:cNvPicPr>
             <a:picLocks noChangeAspect="1"/>
           </p:cNvPicPr>
@@ -20749,7 +20749,7 @@
       </p:pic>
       <p:pic>
         <p:nvPicPr>
-          <p:cNvPr id="1763891059" name=""/>
+          <p:cNvPr id="1112141914" name=""/>
           <p:cNvPicPr>
             <a:picLocks noChangeAspect="1"/>
           </p:cNvPicPr>
@@ -20771,7 +20771,7 @@
       </p:pic>
       <p:pic>
         <p:nvPicPr>
-          <p:cNvPr id="1860474432" name=""/>
+          <p:cNvPr id="1382132162" name=""/>
           <p:cNvPicPr>
             <a:picLocks noChangeAspect="1"/>
           </p:cNvPicPr>
@@ -20793,7 +20793,7 @@
       </p:pic>
       <p:pic>
         <p:nvPicPr>
-          <p:cNvPr id="389666814" name=""/>
+          <p:cNvPr id="1434075804" name=""/>
           <p:cNvPicPr>
             <a:picLocks noChangeAspect="1"/>
           </p:cNvPicPr>
@@ -20816,7 +20816,7 @@
       </p:pic>
       <p:pic>
         <p:nvPicPr>
-          <p:cNvPr id="640466397" name=""/>
+          <p:cNvPr id="1667203658" name=""/>
           <p:cNvPicPr>
             <a:picLocks noChangeAspect="1"/>
           </p:cNvPicPr>
@@ -20839,7 +20839,7 @@
       </p:pic>
       <p:sp>
         <p:nvSpPr>
-          <p:cNvPr id="922135492" name=""/>
+          <p:cNvPr id="923831268" name=""/>
           <p:cNvSpPr txBox="1"/>
           <p:nvPr/>
         </p:nvSpPr>

</xml_diff>